<commit_message>
Poster: Apr 22 version
</commit_message>
<xml_diff>
--- a/poster.pptx
+++ b/poster.pptx
@@ -4,6 +4,9 @@
   <p:sldMasterIdLst>
     <p:sldMasterId id="2147483719" r:id="rId1"/>
   </p:sldMasterIdLst>
+  <p:notesMasterIdLst>
+    <p:notesMasterId r:id="rId3"/>
+  </p:notesMasterIdLst>
   <p:sldIdLst>
     <p:sldId id="256" r:id="rId2"/>
   </p:sldIdLst>
@@ -104,7 +107,445 @@
       </a:defRPr>
     </a:lvl9pPr>
   </p:defaultTextStyle>
+  <p:extLst>
+    <p:ext uri="{EFAFB233-063F-42B5-8137-9DF3F51BA10A}">
+      <p15:sldGuideLst xmlns:p15="http://schemas.microsoft.com/office/powerpoint/2012/main"/>
+    </p:ext>
+  </p:extLst>
 </p:presentation>
+</file>
+
+<file path=ppt/notesMasters/notesMaster1.xml><?xml version="1.0" encoding="utf-8"?>
+<p:notesMaster xmlns:a="http://schemas.openxmlformats.org/drawingml/2006/main" xmlns:r="http://schemas.openxmlformats.org/officeDocument/2006/relationships" xmlns:p="http://schemas.openxmlformats.org/presentationml/2006/main">
+  <p:cSld>
+    <p:bg>
+      <p:bgRef idx="1001">
+        <a:schemeClr val="bg1"/>
+      </p:bgRef>
+    </p:bg>
+    <p:spTree>
+      <p:nvGrpSpPr>
+        <p:cNvPr id="1" name=""/>
+        <p:cNvGrpSpPr/>
+        <p:nvPr/>
+      </p:nvGrpSpPr>
+      <p:grpSpPr>
+        <a:xfrm>
+          <a:off x="0" y="0"/>
+          <a:ext cx="0" cy="0"/>
+          <a:chOff x="0" y="0"/>
+          <a:chExt cx="0" cy="0"/>
+        </a:xfrm>
+      </p:grpSpPr>
+      <p:sp>
+        <p:nvSpPr>
+          <p:cNvPr id="2" name="Header Placeholder 1"/>
+          <p:cNvSpPr>
+            <a:spLocks noGrp="1"/>
+          </p:cNvSpPr>
+          <p:nvPr>
+            <p:ph type="hdr" sz="quarter"/>
+          </p:nvPr>
+        </p:nvSpPr>
+        <p:spPr>
+          <a:xfrm>
+            <a:off x="0" y="0"/>
+            <a:ext cx="2971800" cy="458788"/>
+          </a:xfrm>
+          <a:prstGeom prst="rect">
+            <a:avLst/>
+          </a:prstGeom>
+        </p:spPr>
+        <p:txBody>
+          <a:bodyPr vert="horz" lIns="91440" tIns="45720" rIns="91440" bIns="45720" rtlCol="0"/>
+          <a:lstStyle>
+            <a:lvl1pPr algn="l">
+              <a:defRPr sz="1200"/>
+            </a:lvl1pPr>
+          </a:lstStyle>
+          <a:p>
+            <a:endParaRPr lang="en-US"/>
+          </a:p>
+        </p:txBody>
+      </p:sp>
+      <p:sp>
+        <p:nvSpPr>
+          <p:cNvPr id="3" name="Date Placeholder 2"/>
+          <p:cNvSpPr>
+            <a:spLocks noGrp="1"/>
+          </p:cNvSpPr>
+          <p:nvPr>
+            <p:ph type="dt" idx="1"/>
+          </p:nvPr>
+        </p:nvSpPr>
+        <p:spPr>
+          <a:xfrm>
+            <a:off x="3884613" y="0"/>
+            <a:ext cx="2971800" cy="458788"/>
+          </a:xfrm>
+          <a:prstGeom prst="rect">
+            <a:avLst/>
+          </a:prstGeom>
+        </p:spPr>
+        <p:txBody>
+          <a:bodyPr vert="horz" lIns="91440" tIns="45720" rIns="91440" bIns="45720" rtlCol="0"/>
+          <a:lstStyle>
+            <a:lvl1pPr algn="r">
+              <a:defRPr sz="1200"/>
+            </a:lvl1pPr>
+          </a:lstStyle>
+          <a:p>
+            <a:fld id="{1B3AA9AF-0677-5F4B-BB55-8180843B69E8}" type="datetimeFigureOut">
+              <a:rPr lang="en-US" smtClean="0"/>
+              <a:t>4/22/19</a:t>
+            </a:fld>
+            <a:endParaRPr lang="en-US"/>
+          </a:p>
+        </p:txBody>
+      </p:sp>
+      <p:sp>
+        <p:nvSpPr>
+          <p:cNvPr id="4" name="Slide Image Placeholder 3"/>
+          <p:cNvSpPr>
+            <a:spLocks noGrp="1" noRot="1" noChangeAspect="1"/>
+          </p:cNvSpPr>
+          <p:nvPr>
+            <p:ph type="sldImg" idx="2"/>
+          </p:nvPr>
+        </p:nvSpPr>
+        <p:spPr>
+          <a:xfrm>
+            <a:off x="1371600" y="1143000"/>
+            <a:ext cx="4114800" cy="3086100"/>
+          </a:xfrm>
+          <a:prstGeom prst="rect">
+            <a:avLst/>
+          </a:prstGeom>
+          <a:noFill/>
+          <a:ln w="12700">
+            <a:solidFill>
+              <a:prstClr val="black"/>
+            </a:solidFill>
+          </a:ln>
+        </p:spPr>
+        <p:txBody>
+          <a:bodyPr vert="horz" lIns="91440" tIns="45720" rIns="91440" bIns="45720" rtlCol="0" anchor="ctr"/>
+          <a:lstStyle/>
+          <a:p>
+            <a:endParaRPr lang="en-US"/>
+          </a:p>
+        </p:txBody>
+      </p:sp>
+      <p:sp>
+        <p:nvSpPr>
+          <p:cNvPr id="5" name="Notes Placeholder 4"/>
+          <p:cNvSpPr>
+            <a:spLocks noGrp="1"/>
+          </p:cNvSpPr>
+          <p:nvPr>
+            <p:ph type="body" sz="quarter" idx="3"/>
+          </p:nvPr>
+        </p:nvSpPr>
+        <p:spPr>
+          <a:xfrm>
+            <a:off x="685800" y="4400550"/>
+            <a:ext cx="5486400" cy="3600450"/>
+          </a:xfrm>
+          <a:prstGeom prst="rect">
+            <a:avLst/>
+          </a:prstGeom>
+        </p:spPr>
+        <p:txBody>
+          <a:bodyPr vert="horz" lIns="91440" tIns="45720" rIns="91440" bIns="45720" rtlCol="0"/>
+          <a:lstStyle/>
+          <a:p>
+            <a:pPr lvl="0"/>
+            <a:r>
+              <a:rPr lang="en-US"/>
+              <a:t>Click to edit Master text styles</a:t>
+            </a:r>
+          </a:p>
+          <a:p>
+            <a:pPr lvl="1"/>
+            <a:r>
+              <a:rPr lang="en-US"/>
+              <a:t>Second level</a:t>
+            </a:r>
+          </a:p>
+          <a:p>
+            <a:pPr lvl="2"/>
+            <a:r>
+              <a:rPr lang="en-US"/>
+              <a:t>Third level</a:t>
+            </a:r>
+          </a:p>
+          <a:p>
+            <a:pPr lvl="3"/>
+            <a:r>
+              <a:rPr lang="en-US"/>
+              <a:t>Fourth level</a:t>
+            </a:r>
+          </a:p>
+          <a:p>
+            <a:pPr lvl="4"/>
+            <a:r>
+              <a:rPr lang="en-US"/>
+              <a:t>Fifth level</a:t>
+            </a:r>
+          </a:p>
+        </p:txBody>
+      </p:sp>
+      <p:sp>
+        <p:nvSpPr>
+          <p:cNvPr id="6" name="Footer Placeholder 5"/>
+          <p:cNvSpPr>
+            <a:spLocks noGrp="1"/>
+          </p:cNvSpPr>
+          <p:nvPr>
+            <p:ph type="ftr" sz="quarter" idx="4"/>
+          </p:nvPr>
+        </p:nvSpPr>
+        <p:spPr>
+          <a:xfrm>
+            <a:off x="0" y="8685213"/>
+            <a:ext cx="2971800" cy="458787"/>
+          </a:xfrm>
+          <a:prstGeom prst="rect">
+            <a:avLst/>
+          </a:prstGeom>
+        </p:spPr>
+        <p:txBody>
+          <a:bodyPr vert="horz" lIns="91440" tIns="45720" rIns="91440" bIns="45720" rtlCol="0" anchor="b"/>
+          <a:lstStyle>
+            <a:lvl1pPr algn="l">
+              <a:defRPr sz="1200"/>
+            </a:lvl1pPr>
+          </a:lstStyle>
+          <a:p>
+            <a:endParaRPr lang="en-US"/>
+          </a:p>
+        </p:txBody>
+      </p:sp>
+      <p:sp>
+        <p:nvSpPr>
+          <p:cNvPr id="7" name="Slide Number Placeholder 6"/>
+          <p:cNvSpPr>
+            <a:spLocks noGrp="1"/>
+          </p:cNvSpPr>
+          <p:nvPr>
+            <p:ph type="sldNum" sz="quarter" idx="5"/>
+          </p:nvPr>
+        </p:nvSpPr>
+        <p:spPr>
+          <a:xfrm>
+            <a:off x="3884613" y="8685213"/>
+            <a:ext cx="2971800" cy="458787"/>
+          </a:xfrm>
+          <a:prstGeom prst="rect">
+            <a:avLst/>
+          </a:prstGeom>
+        </p:spPr>
+        <p:txBody>
+          <a:bodyPr vert="horz" lIns="91440" tIns="45720" rIns="91440" bIns="45720" rtlCol="0" anchor="b"/>
+          <a:lstStyle>
+            <a:lvl1pPr algn="r">
+              <a:defRPr sz="1200"/>
+            </a:lvl1pPr>
+          </a:lstStyle>
+          <a:p>
+            <a:fld id="{22234A85-A2BF-AE46-84BE-4BC114ACE005}" type="slidenum">
+              <a:rPr lang="en-US" smtClean="0"/>
+              <a:t>‹#›</a:t>
+            </a:fld>
+            <a:endParaRPr lang="en-US"/>
+          </a:p>
+        </p:txBody>
+      </p:sp>
+    </p:spTree>
+    <p:extLst>
+      <p:ext uri="{BB962C8B-B14F-4D97-AF65-F5344CB8AC3E}">
+        <p14:creationId xmlns:p14="http://schemas.microsoft.com/office/powerpoint/2010/main" val="2816043165"/>
+      </p:ext>
+    </p:extLst>
+  </p:cSld>
+  <p:clrMap bg1="lt1" tx1="dk1" bg2="lt2" tx2="dk2" accent1="accent1" accent2="accent2" accent3="accent3" accent4="accent4" accent5="accent5" accent6="accent6" hlink="hlink" folHlink="folHlink"/>
+  <p:notesStyle>
+    <a:lvl1pPr marL="0" algn="l" defTabSz="914400" rtl="0" eaLnBrk="1" latinLnBrk="0" hangingPunct="1">
+      <a:defRPr sz="1200" kern="1200">
+        <a:solidFill>
+          <a:schemeClr val="tx1"/>
+        </a:solidFill>
+        <a:latin typeface="+mn-lt"/>
+        <a:ea typeface="+mn-ea"/>
+        <a:cs typeface="+mn-cs"/>
+      </a:defRPr>
+    </a:lvl1pPr>
+    <a:lvl2pPr marL="457200" algn="l" defTabSz="914400" rtl="0" eaLnBrk="1" latinLnBrk="0" hangingPunct="1">
+      <a:defRPr sz="1200" kern="1200">
+        <a:solidFill>
+          <a:schemeClr val="tx1"/>
+        </a:solidFill>
+        <a:latin typeface="+mn-lt"/>
+        <a:ea typeface="+mn-ea"/>
+        <a:cs typeface="+mn-cs"/>
+      </a:defRPr>
+    </a:lvl2pPr>
+    <a:lvl3pPr marL="914400" algn="l" defTabSz="914400" rtl="0" eaLnBrk="1" latinLnBrk="0" hangingPunct="1">
+      <a:defRPr sz="1200" kern="1200">
+        <a:solidFill>
+          <a:schemeClr val="tx1"/>
+        </a:solidFill>
+        <a:latin typeface="+mn-lt"/>
+        <a:ea typeface="+mn-ea"/>
+        <a:cs typeface="+mn-cs"/>
+      </a:defRPr>
+    </a:lvl3pPr>
+    <a:lvl4pPr marL="1371600" algn="l" defTabSz="914400" rtl="0" eaLnBrk="1" latinLnBrk="0" hangingPunct="1">
+      <a:defRPr sz="1200" kern="1200">
+        <a:solidFill>
+          <a:schemeClr val="tx1"/>
+        </a:solidFill>
+        <a:latin typeface="+mn-lt"/>
+        <a:ea typeface="+mn-ea"/>
+        <a:cs typeface="+mn-cs"/>
+      </a:defRPr>
+    </a:lvl4pPr>
+    <a:lvl5pPr marL="1828800" algn="l" defTabSz="914400" rtl="0" eaLnBrk="1" latinLnBrk="0" hangingPunct="1">
+      <a:defRPr sz="1200" kern="1200">
+        <a:solidFill>
+          <a:schemeClr val="tx1"/>
+        </a:solidFill>
+        <a:latin typeface="+mn-lt"/>
+        <a:ea typeface="+mn-ea"/>
+        <a:cs typeface="+mn-cs"/>
+      </a:defRPr>
+    </a:lvl5pPr>
+    <a:lvl6pPr marL="2286000" algn="l" defTabSz="914400" rtl="0" eaLnBrk="1" latinLnBrk="0" hangingPunct="1">
+      <a:defRPr sz="1200" kern="1200">
+        <a:solidFill>
+          <a:schemeClr val="tx1"/>
+        </a:solidFill>
+        <a:latin typeface="+mn-lt"/>
+        <a:ea typeface="+mn-ea"/>
+        <a:cs typeface="+mn-cs"/>
+      </a:defRPr>
+    </a:lvl6pPr>
+    <a:lvl7pPr marL="2743200" algn="l" defTabSz="914400" rtl="0" eaLnBrk="1" latinLnBrk="0" hangingPunct="1">
+      <a:defRPr sz="1200" kern="1200">
+        <a:solidFill>
+          <a:schemeClr val="tx1"/>
+        </a:solidFill>
+        <a:latin typeface="+mn-lt"/>
+        <a:ea typeface="+mn-ea"/>
+        <a:cs typeface="+mn-cs"/>
+      </a:defRPr>
+    </a:lvl7pPr>
+    <a:lvl8pPr marL="3200400" algn="l" defTabSz="914400" rtl="0" eaLnBrk="1" latinLnBrk="0" hangingPunct="1">
+      <a:defRPr sz="1200" kern="1200">
+        <a:solidFill>
+          <a:schemeClr val="tx1"/>
+        </a:solidFill>
+        <a:latin typeface="+mn-lt"/>
+        <a:ea typeface="+mn-ea"/>
+        <a:cs typeface="+mn-cs"/>
+      </a:defRPr>
+    </a:lvl8pPr>
+    <a:lvl9pPr marL="3657600" algn="l" defTabSz="914400" rtl="0" eaLnBrk="1" latinLnBrk="0" hangingPunct="1">
+      <a:defRPr sz="1200" kern="1200">
+        <a:solidFill>
+          <a:schemeClr val="tx1"/>
+        </a:solidFill>
+        <a:latin typeface="+mn-lt"/>
+        <a:ea typeface="+mn-ea"/>
+        <a:cs typeface="+mn-cs"/>
+      </a:defRPr>
+    </a:lvl9pPr>
+  </p:notesStyle>
+</p:notesMaster>
+</file>
+
+<file path=ppt/notesSlides/notesSlide1.xml><?xml version="1.0" encoding="utf-8"?>
+<p:notes xmlns:a="http://schemas.openxmlformats.org/drawingml/2006/main" xmlns:r="http://schemas.openxmlformats.org/officeDocument/2006/relationships" xmlns:p="http://schemas.openxmlformats.org/presentationml/2006/main">
+  <p:cSld>
+    <p:spTree>
+      <p:nvGrpSpPr>
+        <p:cNvPr id="1" name=""/>
+        <p:cNvGrpSpPr/>
+        <p:nvPr/>
+      </p:nvGrpSpPr>
+      <p:grpSpPr>
+        <a:xfrm>
+          <a:off x="0" y="0"/>
+          <a:ext cx="0" cy="0"/>
+          <a:chOff x="0" y="0"/>
+          <a:chExt cx="0" cy="0"/>
+        </a:xfrm>
+      </p:grpSpPr>
+      <p:sp>
+        <p:nvSpPr>
+          <p:cNvPr id="2" name="Slide Image Placeholder 1"/>
+          <p:cNvSpPr>
+            <a:spLocks noGrp="1" noRot="1" noChangeAspect="1"/>
+          </p:cNvSpPr>
+          <p:nvPr>
+            <p:ph type="sldImg"/>
+          </p:nvPr>
+        </p:nvSpPr>
+        <p:spPr/>
+      </p:sp>
+      <p:sp>
+        <p:nvSpPr>
+          <p:cNvPr id="3" name="Notes Placeholder 2"/>
+          <p:cNvSpPr>
+            <a:spLocks noGrp="1"/>
+          </p:cNvSpPr>
+          <p:nvPr>
+            <p:ph type="body" idx="1"/>
+          </p:nvPr>
+        </p:nvSpPr>
+        <p:spPr/>
+        <p:txBody>
+          <a:bodyPr/>
+          <a:lstStyle/>
+          <a:p>
+            <a:endParaRPr lang="en-US" dirty="0"/>
+          </a:p>
+        </p:txBody>
+      </p:sp>
+      <p:sp>
+        <p:nvSpPr>
+          <p:cNvPr id="4" name="Slide Number Placeholder 3"/>
+          <p:cNvSpPr>
+            <a:spLocks noGrp="1"/>
+          </p:cNvSpPr>
+          <p:nvPr>
+            <p:ph type="sldNum" sz="quarter" idx="5"/>
+          </p:nvPr>
+        </p:nvSpPr>
+        <p:spPr/>
+        <p:txBody>
+          <a:bodyPr/>
+          <a:lstStyle/>
+          <a:p>
+            <a:fld id="{22234A85-A2BF-AE46-84BE-4BC114ACE005}" type="slidenum">
+              <a:rPr lang="en-US" smtClean="0"/>
+              <a:t>1</a:t>
+            </a:fld>
+            <a:endParaRPr lang="en-US"/>
+          </a:p>
+        </p:txBody>
+      </p:sp>
+    </p:spTree>
+    <p:extLst>
+      <p:ext uri="{BB962C8B-B14F-4D97-AF65-F5344CB8AC3E}">
+        <p14:creationId xmlns:p14="http://schemas.microsoft.com/office/powerpoint/2010/main" val="2826129268"/>
+      </p:ext>
+    </p:extLst>
+  </p:cSld>
+  <p:clrMapOvr>
+    <a:masterClrMapping/>
+  </p:clrMapOvr>
+</p:notes>
 </file>
 
 <file path=ppt/slideLayouts/slideLayout1.xml><?xml version="1.0" encoding="utf-8"?>
@@ -238,7 +679,7 @@
           <a:p>
             <a:fld id="{773F4608-2C34-4546-97E8-AB075EF485EC}" type="datetimeFigureOut">
               <a:rPr lang="en-US" smtClean="0"/>
-              <a:t>4/20/19</a:t>
+              <a:t>4/22/19</a:t>
             </a:fld>
             <a:endParaRPr lang="en-US" dirty="0"/>
           </a:p>
@@ -408,7 +849,7 @@
           <a:p>
             <a:fld id="{773F4608-2C34-4546-97E8-AB075EF485EC}" type="datetimeFigureOut">
               <a:rPr lang="en-US" smtClean="0"/>
-              <a:t>4/20/19</a:t>
+              <a:t>4/22/19</a:t>
             </a:fld>
             <a:endParaRPr lang="en-US" dirty="0"/>
           </a:p>
@@ -588,7 +1029,7 @@
           <a:p>
             <a:fld id="{773F4608-2C34-4546-97E8-AB075EF485EC}" type="datetimeFigureOut">
               <a:rPr lang="en-US" smtClean="0"/>
-              <a:t>4/20/19</a:t>
+              <a:t>4/22/19</a:t>
             </a:fld>
             <a:endParaRPr lang="en-US" dirty="0"/>
           </a:p>
@@ -758,7 +1199,7 @@
           <a:p>
             <a:fld id="{773F4608-2C34-4546-97E8-AB075EF485EC}" type="datetimeFigureOut">
               <a:rPr lang="en-US" smtClean="0"/>
-              <a:t>4/20/19</a:t>
+              <a:t>4/22/19</a:t>
             </a:fld>
             <a:endParaRPr lang="en-US" dirty="0"/>
           </a:p>
@@ -1002,7 +1443,7 @@
           <a:p>
             <a:fld id="{773F4608-2C34-4546-97E8-AB075EF485EC}" type="datetimeFigureOut">
               <a:rPr lang="en-US" smtClean="0"/>
-              <a:t>4/20/19</a:t>
+              <a:t>4/22/19</a:t>
             </a:fld>
             <a:endParaRPr lang="en-US" dirty="0"/>
           </a:p>
@@ -1234,7 +1675,7 @@
           <a:p>
             <a:fld id="{773F4608-2C34-4546-97E8-AB075EF485EC}" type="datetimeFigureOut">
               <a:rPr lang="en-US" smtClean="0"/>
-              <a:t>4/20/19</a:t>
+              <a:t>4/22/19</a:t>
             </a:fld>
             <a:endParaRPr lang="en-US" dirty="0"/>
           </a:p>
@@ -1601,7 +2042,7 @@
           <a:p>
             <a:fld id="{773F4608-2C34-4546-97E8-AB075EF485EC}" type="datetimeFigureOut">
               <a:rPr lang="en-US" smtClean="0"/>
-              <a:t>4/20/19</a:t>
+              <a:t>4/22/19</a:t>
             </a:fld>
             <a:endParaRPr lang="en-US" dirty="0"/>
           </a:p>
@@ -1719,7 +2160,7 @@
           <a:p>
             <a:fld id="{773F4608-2C34-4546-97E8-AB075EF485EC}" type="datetimeFigureOut">
               <a:rPr lang="en-US" smtClean="0"/>
-              <a:t>4/20/19</a:t>
+              <a:t>4/22/19</a:t>
             </a:fld>
             <a:endParaRPr lang="en-US" dirty="0"/>
           </a:p>
@@ -1814,7 +2255,7 @@
           <a:p>
             <a:fld id="{773F4608-2C34-4546-97E8-AB075EF485EC}" type="datetimeFigureOut">
               <a:rPr lang="en-US" smtClean="0"/>
-              <a:t>4/20/19</a:t>
+              <a:t>4/22/19</a:t>
             </a:fld>
             <a:endParaRPr lang="en-US" dirty="0"/>
           </a:p>
@@ -2091,7 +2532,7 @@
           <a:p>
             <a:fld id="{773F4608-2C34-4546-97E8-AB075EF485EC}" type="datetimeFigureOut">
               <a:rPr lang="en-US" smtClean="0"/>
-              <a:t>4/20/19</a:t>
+              <a:t>4/22/19</a:t>
             </a:fld>
             <a:endParaRPr lang="en-US" dirty="0"/>
           </a:p>
@@ -2347,7 +2788,7 @@
           <a:p>
             <a:fld id="{773F4608-2C34-4546-97E8-AB075EF485EC}" type="datetimeFigureOut">
               <a:rPr lang="en-US" smtClean="0"/>
-              <a:t>4/20/19</a:t>
+              <a:t>4/22/19</a:t>
             </a:fld>
             <a:endParaRPr lang="en-US" dirty="0"/>
           </a:p>
@@ -2560,7 +3001,7 @@
           <a:p>
             <a:fld id="{773F4608-2C34-4546-97E8-AB075EF485EC}" type="datetimeFigureOut">
               <a:rPr lang="en-US" smtClean="0"/>
-              <a:t>4/20/19</a:t>
+              <a:t>4/22/19</a:t>
             </a:fld>
             <a:endParaRPr lang="en-US" dirty="0"/>
           </a:p>
@@ -3016,14 +3457,14 @@
           <a:p>
             <a:pPr algn="ctr"/>
             <a:r>
-              <a:rPr lang="en-US" sz="8800" dirty="0">
+              <a:rPr lang="en-US" sz="7200" b="1" dirty="0">
                 <a:solidFill>
                   <a:schemeClr val="bg1"/>
                 </a:solidFill>
-                <a:latin typeface="Arial" panose="020B0604020202020204" pitchFamily="34" charset="0"/>
+                <a:latin typeface="Libre Baskerville" panose="02000000000000000000" pitchFamily="2" charset="0"/>
                 <a:cs typeface="Arial" panose="020B0604020202020204" pitchFamily="34" charset="0"/>
               </a:rPr>
-              <a:t>Autonomous Mobility On-Demand Using Deep Learning</a:t>
+              <a:t>Autonomous Mobility on Demand Using Deep Learning</a:t>
             </a:r>
           </a:p>
           <a:p>
@@ -3033,11 +3474,11 @@
               </a:spcBef>
             </a:pPr>
             <a:r>
-              <a:rPr lang="en-US" sz="6400" dirty="0">
+              <a:rPr lang="en-US" sz="5600" dirty="0">
                 <a:solidFill>
                   <a:schemeClr val="bg1"/>
                 </a:solidFill>
-                <a:latin typeface="Arial" panose="020B0604020202020204" pitchFamily="34" charset="0"/>
+                <a:latin typeface="Libre Baskerville" panose="02000000000000000000" pitchFamily="2" charset="0"/>
                 <a:cs typeface="Arial" panose="020B0604020202020204" pitchFamily="34" charset="0"/>
               </a:rPr>
               <a:t>Dong Chen, Hangting Cao, Hui Sun, Junzhe Xu, and Kedong He</a:t>
@@ -3054,7 +3495,7 @@
                 <a:solidFill>
                   <a:schemeClr val="bg1"/>
                 </a:solidFill>
-                <a:latin typeface="Arial" panose="020B0604020202020204" pitchFamily="34" charset="0"/>
+                <a:latin typeface="Libre Baskerville" panose="02000000000000000000" pitchFamily="2" charset="0"/>
                 <a:cs typeface="Arial" panose="020B0604020202020204" pitchFamily="34" charset="0"/>
               </a:rPr>
               <a:t>{donchen,hangting,huisunum,junzhexu,kedongh}@umich.edu</a:t>
@@ -3077,21 +3518,1918 @@
           <p:nvPr/>
         </p:nvPicPr>
         <p:blipFill>
-          <a:blip r:embed="rId2"/>
+          <a:blip r:embed="rId3"/>
           <a:stretch>
             <a:fillRect/>
           </a:stretch>
         </p:blipFill>
         <p:spPr>
           <a:xfrm>
-            <a:off x="814915" y="988718"/>
-            <a:ext cx="2479323" cy="1652882"/>
+            <a:off x="700615" y="609600"/>
+            <a:ext cx="3048000" cy="2032000"/>
           </a:xfrm>
           <a:prstGeom prst="rect">
             <a:avLst/>
           </a:prstGeom>
         </p:spPr>
       </p:pic>
+      <p:cxnSp>
+        <p:nvCxnSpPr>
+          <p:cNvPr id="4" name="Straight Connector 3">
+            <a:extLst>
+              <a:ext uri="{FF2B5EF4-FFF2-40B4-BE49-F238E27FC236}">
+                <a16:creationId xmlns:a16="http://schemas.microsoft.com/office/drawing/2014/main" id="{C8FD0724-811C-B540-A7BD-0738D727AAD9}"/>
+              </a:ext>
+            </a:extLst>
+          </p:cNvPr>
+          <p:cNvCxnSpPr>
+            <a:cxnSpLocks/>
+          </p:cNvCxnSpPr>
+          <p:nvPr/>
+        </p:nvCxnSpPr>
+        <p:spPr>
+          <a:xfrm>
+            <a:off x="11826821" y="3945321"/>
+            <a:ext cx="0" cy="22793190"/>
+          </a:xfrm>
+          <a:prstGeom prst="line">
+            <a:avLst/>
+          </a:prstGeom>
+        </p:spPr>
+        <p:style>
+          <a:lnRef idx="1">
+            <a:schemeClr val="accent1"/>
+          </a:lnRef>
+          <a:fillRef idx="0">
+            <a:schemeClr val="accent1"/>
+          </a:fillRef>
+          <a:effectRef idx="0">
+            <a:schemeClr val="accent1"/>
+          </a:effectRef>
+          <a:fontRef idx="minor">
+            <a:schemeClr val="tx1"/>
+          </a:fontRef>
+        </p:style>
+      </p:cxnSp>
+      <p:cxnSp>
+        <p:nvCxnSpPr>
+          <p:cNvPr id="7" name="Straight Connector 6">
+            <a:extLst>
+              <a:ext uri="{FF2B5EF4-FFF2-40B4-BE49-F238E27FC236}">
+                <a16:creationId xmlns:a16="http://schemas.microsoft.com/office/drawing/2014/main" id="{8A84D6C9-E667-C74E-92E3-39FB35772DE5}"/>
+              </a:ext>
+            </a:extLst>
+          </p:cNvPr>
+          <p:cNvCxnSpPr>
+            <a:cxnSpLocks/>
+          </p:cNvCxnSpPr>
+          <p:nvPr/>
+        </p:nvCxnSpPr>
+        <p:spPr>
+          <a:xfrm>
+            <a:off x="24755421" y="3945321"/>
+            <a:ext cx="0" cy="22793190"/>
+          </a:xfrm>
+          <a:prstGeom prst="line">
+            <a:avLst/>
+          </a:prstGeom>
+        </p:spPr>
+        <p:style>
+          <a:lnRef idx="1">
+            <a:schemeClr val="accent1"/>
+          </a:lnRef>
+          <a:fillRef idx="0">
+            <a:schemeClr val="accent1"/>
+          </a:fillRef>
+          <a:effectRef idx="0">
+            <a:schemeClr val="accent1"/>
+          </a:effectRef>
+          <a:fontRef idx="minor">
+            <a:schemeClr val="tx1"/>
+          </a:fontRef>
+        </p:style>
+      </p:cxnSp>
+      <p:grpSp>
+        <p:nvGrpSpPr>
+          <p:cNvPr id="19" name="Group 18">
+            <a:extLst>
+              <a:ext uri="{FF2B5EF4-FFF2-40B4-BE49-F238E27FC236}">
+                <a16:creationId xmlns:a16="http://schemas.microsoft.com/office/drawing/2014/main" id="{02B8BB1D-AA02-B842-BC24-BA920A069D07}"/>
+              </a:ext>
+            </a:extLst>
+          </p:cNvPr>
+          <p:cNvGrpSpPr/>
+          <p:nvPr/>
+        </p:nvGrpSpPr>
+        <p:grpSpPr>
+          <a:xfrm>
+            <a:off x="563232" y="4278650"/>
+            <a:ext cx="10946274" cy="7216663"/>
+            <a:chOff x="563232" y="4278651"/>
+            <a:chExt cx="10946274" cy="6438827"/>
+          </a:xfrm>
+        </p:grpSpPr>
+        <p:sp>
+          <p:nvSpPr>
+            <p:cNvPr id="18" name="Rectangle 17">
+              <a:extLst>
+                <a:ext uri="{FF2B5EF4-FFF2-40B4-BE49-F238E27FC236}">
+                  <a16:creationId xmlns:a16="http://schemas.microsoft.com/office/drawing/2014/main" id="{8D4A4ED2-F920-2441-BB16-EDC85FF19FFD}"/>
+                </a:ext>
+              </a:extLst>
+            </p:cNvPr>
+            <p:cNvSpPr/>
+            <p:nvPr/>
+          </p:nvSpPr>
+          <p:spPr>
+            <a:xfrm>
+              <a:off x="563232" y="4278651"/>
+              <a:ext cx="10946274" cy="1173882"/>
+            </a:xfrm>
+            <a:prstGeom prst="rect">
+              <a:avLst/>
+            </a:prstGeom>
+            <a:solidFill>
+              <a:srgbClr val="002B61"/>
+            </a:solidFill>
+          </p:spPr>
+          <p:style>
+            <a:lnRef idx="2">
+              <a:schemeClr val="accent1">
+                <a:shade val="50000"/>
+              </a:schemeClr>
+            </a:lnRef>
+            <a:fillRef idx="1">
+              <a:schemeClr val="accent1"/>
+            </a:fillRef>
+            <a:effectRef idx="0">
+              <a:schemeClr val="accent1"/>
+            </a:effectRef>
+            <a:fontRef idx="minor">
+              <a:schemeClr val="lt1"/>
+            </a:fontRef>
+          </p:style>
+          <p:txBody>
+            <a:bodyPr rtlCol="0" anchor="ctr" anchorCtr="0"/>
+            <a:lstStyle/>
+            <a:p>
+              <a:pPr algn="ctr"/>
+              <a:r>
+                <a:rPr lang="en-US" sz="5600" dirty="0">
+                  <a:solidFill>
+                    <a:schemeClr val="bg1"/>
+                  </a:solidFill>
+                  <a:latin typeface="Libre Baskerville" panose="02000000000000000000" pitchFamily="2" charset="0"/>
+                </a:rPr>
+                <a:t>Introduction</a:t>
+              </a:r>
+            </a:p>
+          </p:txBody>
+        </p:sp>
+        <p:sp>
+          <p:nvSpPr>
+            <p:cNvPr id="8" name="Rectangle 7">
+              <a:extLst>
+                <a:ext uri="{FF2B5EF4-FFF2-40B4-BE49-F238E27FC236}">
+                  <a16:creationId xmlns:a16="http://schemas.microsoft.com/office/drawing/2014/main" id="{394FD90E-4055-5149-BD5C-76017547CCC0}"/>
+                </a:ext>
+              </a:extLst>
+            </p:cNvPr>
+            <p:cNvSpPr/>
+            <p:nvPr/>
+          </p:nvSpPr>
+          <p:spPr>
+            <a:xfrm>
+              <a:off x="563232" y="5452532"/>
+              <a:ext cx="10946274" cy="5264946"/>
+            </a:xfrm>
+            <a:prstGeom prst="rect">
+              <a:avLst/>
+            </a:prstGeom>
+            <a:noFill/>
+          </p:spPr>
+          <p:style>
+            <a:lnRef idx="2">
+              <a:schemeClr val="accent1">
+                <a:shade val="50000"/>
+              </a:schemeClr>
+            </a:lnRef>
+            <a:fillRef idx="1">
+              <a:schemeClr val="accent1"/>
+            </a:fillRef>
+            <a:effectRef idx="0">
+              <a:schemeClr val="accent1"/>
+            </a:effectRef>
+            <a:fontRef idx="minor">
+              <a:schemeClr val="lt1"/>
+            </a:fontRef>
+          </p:style>
+          <p:txBody>
+            <a:bodyPr rtlCol="0" anchor="ctr" anchorCtr="0"/>
+            <a:lstStyle/>
+            <a:p>
+              <a:r>
+                <a:rPr lang="en-US" sz="3600" dirty="0">
+                  <a:solidFill>
+                    <a:schemeClr val="tx1"/>
+                  </a:solidFill>
+                  <a:latin typeface="Times New Roman" panose="02020603050405020304" pitchFamily="18" charset="0"/>
+                  <a:cs typeface="Times New Roman" panose="02020603050405020304" pitchFamily="18" charset="0"/>
+                </a:rPr>
+                <a:t>With higher speed and less time spent in parking, autonomous mobility-on-demand (</a:t>
+              </a:r>
+              <a:r>
+                <a:rPr lang="en-US" sz="3600" dirty="0" err="1">
+                  <a:solidFill>
+                    <a:schemeClr val="tx1"/>
+                  </a:solidFill>
+                  <a:latin typeface="Times New Roman" panose="02020603050405020304" pitchFamily="18" charset="0"/>
+                  <a:cs typeface="Times New Roman" panose="02020603050405020304" pitchFamily="18" charset="0"/>
+                </a:rPr>
+                <a:t>AMoD</a:t>
+              </a:r>
+              <a:r>
+                <a:rPr lang="en-US" sz="3600" dirty="0">
+                  <a:solidFill>
+                    <a:schemeClr val="tx1"/>
+                  </a:solidFill>
+                  <a:latin typeface="Times New Roman" panose="02020603050405020304" pitchFamily="18" charset="0"/>
+                  <a:cs typeface="Times New Roman" panose="02020603050405020304" pitchFamily="18" charset="0"/>
+                </a:rPr>
+                <a:t>) system is predicted to be the solution for the future to reduce the pressure from urban mobility. In this project, we adopts Deep Q-Learning network (DQN) of the previous work and Actor-Critic Network (A2C), and creates new new states and actions, which are more close to the actual situation. The combination of the modified networks and the novel variables make the </a:t>
+              </a:r>
+              <a:r>
+                <a:rPr lang="en-US" sz="3600" dirty="0" err="1">
+                  <a:solidFill>
+                    <a:schemeClr val="tx1"/>
+                  </a:solidFill>
+                  <a:latin typeface="Times New Roman" panose="02020603050405020304" pitchFamily="18" charset="0"/>
+                  <a:cs typeface="Times New Roman" panose="02020603050405020304" pitchFamily="18" charset="0"/>
+                </a:rPr>
+                <a:t>AMoD</a:t>
+              </a:r>
+              <a:r>
+                <a:rPr lang="en-US" sz="3600" dirty="0">
+                  <a:solidFill>
+                    <a:schemeClr val="tx1"/>
+                  </a:solidFill>
+                  <a:latin typeface="Times New Roman" panose="02020603050405020304" pitchFamily="18" charset="0"/>
+                  <a:cs typeface="Times New Roman" panose="02020603050405020304" pitchFamily="18" charset="0"/>
+                </a:rPr>
+                <a:t> system more reliable.</a:t>
+              </a:r>
+            </a:p>
+          </p:txBody>
+        </p:sp>
+      </p:grpSp>
+      <p:grpSp>
+        <p:nvGrpSpPr>
+          <p:cNvPr id="20" name="Group 19">
+            <a:extLst>
+              <a:ext uri="{FF2B5EF4-FFF2-40B4-BE49-F238E27FC236}">
+                <a16:creationId xmlns:a16="http://schemas.microsoft.com/office/drawing/2014/main" id="{FCA93F17-D80E-514E-A52D-EBCF5A975A71}"/>
+              </a:ext>
+            </a:extLst>
+          </p:cNvPr>
+          <p:cNvGrpSpPr/>
+          <p:nvPr/>
+        </p:nvGrpSpPr>
+        <p:grpSpPr>
+          <a:xfrm>
+            <a:off x="560108" y="12321785"/>
+            <a:ext cx="10946274" cy="14415006"/>
+            <a:chOff x="563232" y="2664103"/>
+            <a:chExt cx="10946274" cy="14415006"/>
+          </a:xfrm>
+        </p:grpSpPr>
+        <p:sp>
+          <p:nvSpPr>
+            <p:cNvPr id="21" name="Rectangle 20">
+              <a:extLst>
+                <a:ext uri="{FF2B5EF4-FFF2-40B4-BE49-F238E27FC236}">
+                  <a16:creationId xmlns:a16="http://schemas.microsoft.com/office/drawing/2014/main" id="{69843C0F-B03A-6C45-AD52-D16D5FC7C49E}"/>
+                </a:ext>
+              </a:extLst>
+            </p:cNvPr>
+            <p:cNvSpPr/>
+            <p:nvPr/>
+          </p:nvSpPr>
+          <p:spPr>
+            <a:xfrm>
+              <a:off x="563232" y="2664103"/>
+              <a:ext cx="10946274" cy="1173882"/>
+            </a:xfrm>
+            <a:prstGeom prst="rect">
+              <a:avLst/>
+            </a:prstGeom>
+            <a:solidFill>
+              <a:srgbClr val="002B61"/>
+            </a:solidFill>
+          </p:spPr>
+          <p:style>
+            <a:lnRef idx="2">
+              <a:schemeClr val="accent1">
+                <a:shade val="50000"/>
+              </a:schemeClr>
+            </a:lnRef>
+            <a:fillRef idx="1">
+              <a:schemeClr val="accent1"/>
+            </a:fillRef>
+            <a:effectRef idx="0">
+              <a:schemeClr val="accent1"/>
+            </a:effectRef>
+            <a:fontRef idx="minor">
+              <a:schemeClr val="lt1"/>
+            </a:fontRef>
+          </p:style>
+          <p:txBody>
+            <a:bodyPr rtlCol="0" anchor="ctr"/>
+            <a:lstStyle/>
+            <a:p>
+              <a:pPr algn="ctr"/>
+              <a:r>
+                <a:rPr lang="en-US" sz="5600" dirty="0">
+                  <a:solidFill>
+                    <a:schemeClr val="bg1"/>
+                  </a:solidFill>
+                  <a:latin typeface="Libre Baskerville" panose="02000000000000000000" pitchFamily="2" charset="0"/>
+                </a:rPr>
+                <a:t>Model</a:t>
+              </a:r>
+            </a:p>
+          </p:txBody>
+        </p:sp>
+        <p:sp>
+          <p:nvSpPr>
+            <p:cNvPr id="22" name="Rectangle 21">
+              <a:extLst>
+                <a:ext uri="{FF2B5EF4-FFF2-40B4-BE49-F238E27FC236}">
+                  <a16:creationId xmlns:a16="http://schemas.microsoft.com/office/drawing/2014/main" id="{0F2D1DB1-55F8-CB47-A885-3567C741F9DF}"/>
+                </a:ext>
+              </a:extLst>
+            </p:cNvPr>
+            <p:cNvSpPr/>
+            <p:nvPr/>
+          </p:nvSpPr>
+          <p:spPr>
+            <a:xfrm>
+              <a:off x="563232" y="3837985"/>
+              <a:ext cx="10946274" cy="13241124"/>
+            </a:xfrm>
+            <a:prstGeom prst="rect">
+              <a:avLst/>
+            </a:prstGeom>
+            <a:noFill/>
+          </p:spPr>
+          <p:style>
+            <a:lnRef idx="2">
+              <a:schemeClr val="accent1">
+                <a:shade val="50000"/>
+              </a:schemeClr>
+            </a:lnRef>
+            <a:fillRef idx="1">
+              <a:schemeClr val="accent1"/>
+            </a:fillRef>
+            <a:effectRef idx="0">
+              <a:schemeClr val="accent1"/>
+            </a:effectRef>
+            <a:fontRef idx="minor">
+              <a:schemeClr val="lt1"/>
+            </a:fontRef>
+          </p:style>
+          <p:txBody>
+            <a:bodyPr rtlCol="0" anchor="ctr"/>
+            <a:lstStyle/>
+            <a:p>
+              <a:r>
+                <a:rPr lang="en-US" sz="3600" b="1" i="1" dirty="0">
+                  <a:solidFill>
+                    <a:schemeClr val="tx1"/>
+                  </a:solidFill>
+                  <a:latin typeface="Times New Roman" panose="02020603050405020304" pitchFamily="18" charset="0"/>
+                  <a:cs typeface="Times New Roman" panose="02020603050405020304" pitchFamily="18" charset="0"/>
+                </a:rPr>
+                <a:t>Data Preprocess</a:t>
+              </a:r>
+            </a:p>
+            <a:p>
+              <a:r>
+                <a:rPr lang="en-US" sz="3600" dirty="0">
+                  <a:solidFill>
+                    <a:schemeClr val="tx1"/>
+                  </a:solidFill>
+                  <a:latin typeface="Times New Roman" panose="02020603050405020304" pitchFamily="18" charset="0"/>
+                  <a:cs typeface="Times New Roman" panose="02020603050405020304" pitchFamily="18" charset="0"/>
+                </a:rPr>
+                <a:t>The server will provide information on both the vehicles and requests, and the algorithm should process the information to obtain the states (</a:t>
+              </a:r>
+              <a:r>
+                <a:rPr lang="en-US" sz="3600" i="1" dirty="0">
+                  <a:solidFill>
+                    <a:schemeClr val="tx1"/>
+                  </a:solidFill>
+                  <a:latin typeface="Times New Roman" panose="02020603050405020304" pitchFamily="18" charset="0"/>
+                  <a:cs typeface="Times New Roman" panose="02020603050405020304" pitchFamily="18" charset="0"/>
+                </a:rPr>
+                <a:t>S</a:t>
+              </a:r>
+              <a:r>
+                <a:rPr lang="en-US" sz="3600" dirty="0">
+                  <a:solidFill>
+                    <a:schemeClr val="tx1"/>
+                  </a:solidFill>
+                  <a:latin typeface="Times New Roman" panose="02020603050405020304" pitchFamily="18" charset="0"/>
+                  <a:cs typeface="Times New Roman" panose="02020603050405020304" pitchFamily="18" charset="0"/>
+                </a:rPr>
+                <a:t>), action space(</a:t>
+              </a:r>
+              <a:r>
+                <a:rPr lang="en-US" sz="3600" i="1" dirty="0">
+                  <a:solidFill>
+                    <a:schemeClr val="tx1"/>
+                  </a:solidFill>
+                  <a:latin typeface="Times New Roman" panose="02020603050405020304" pitchFamily="18" charset="0"/>
+                  <a:cs typeface="Times New Roman" panose="02020603050405020304" pitchFamily="18" charset="0"/>
+                </a:rPr>
+                <a:t>A</a:t>
+              </a:r>
+              <a:r>
+                <a:rPr lang="en-US" sz="3600" dirty="0">
+                  <a:solidFill>
+                    <a:schemeClr val="tx1"/>
+                  </a:solidFill>
+                  <a:latin typeface="Times New Roman" panose="02020603050405020304" pitchFamily="18" charset="0"/>
+                  <a:cs typeface="Times New Roman" panose="02020603050405020304" pitchFamily="18" charset="0"/>
+                </a:rPr>
+                <a:t>). The state that goes into the neural network is counting-based, including:</a:t>
+              </a:r>
+            </a:p>
+            <a:p>
+              <a:pPr marL="571500" indent="-571500">
+                <a:buFont typeface="Arial" panose="020B0604020202020204" pitchFamily="34" charset="0"/>
+                <a:buChar char="•"/>
+              </a:pPr>
+              <a:r>
+                <a:rPr lang="en-US" sz="3600" dirty="0">
+                  <a:solidFill>
+                    <a:schemeClr val="tx1"/>
+                  </a:solidFill>
+                  <a:latin typeface="Times New Roman" panose="02020603050405020304" pitchFamily="18" charset="0"/>
+                  <a:cs typeface="Times New Roman" panose="02020603050405020304" pitchFamily="18" charset="0"/>
+                </a:rPr>
+                <a:t>All requests in the adjacent regions</a:t>
+              </a:r>
+            </a:p>
+            <a:p>
+              <a:pPr marL="571500" indent="-571500">
+                <a:buFont typeface="Arial" panose="020B0604020202020204" pitchFamily="34" charset="0"/>
+                <a:buChar char="•"/>
+              </a:pPr>
+              <a:r>
+                <a:rPr lang="en-US" sz="3600" dirty="0">
+                  <a:solidFill>
+                    <a:schemeClr val="tx1"/>
+                  </a:solidFill>
+                  <a:latin typeface="Times New Roman" panose="02020603050405020304" pitchFamily="18" charset="0"/>
+                  <a:cs typeface="Times New Roman" panose="02020603050405020304" pitchFamily="18" charset="0"/>
+                </a:rPr>
+                <a:t>The requests in the last hour, recorded into 4 sections, 15 mins for each section</a:t>
+              </a:r>
+            </a:p>
+            <a:p>
+              <a:pPr marL="571500" indent="-571500">
+                <a:buFont typeface="Arial" panose="020B0604020202020204" pitchFamily="34" charset="0"/>
+                <a:buChar char="•"/>
+              </a:pPr>
+              <a:r>
+                <a:rPr lang="en-US" sz="3600" dirty="0">
+                  <a:solidFill>
+                    <a:schemeClr val="tx1"/>
+                  </a:solidFill>
+                  <a:latin typeface="Times New Roman" panose="02020603050405020304" pitchFamily="18" charset="0"/>
+                  <a:cs typeface="Times New Roman" panose="02020603050405020304" pitchFamily="18" charset="0"/>
+                </a:rPr>
+                <a:t>The number of available vehicles in each region</a:t>
+              </a:r>
+            </a:p>
+            <a:p>
+              <a:pPr marL="571500" indent="-571500">
+                <a:buFont typeface="Arial" panose="020B0604020202020204" pitchFamily="34" charset="0"/>
+                <a:buChar char="•"/>
+              </a:pPr>
+              <a:endParaRPr lang="en-US" sz="3600" dirty="0">
+                <a:solidFill>
+                  <a:schemeClr val="tx1"/>
+                </a:solidFill>
+                <a:latin typeface="Times New Roman" panose="02020603050405020304" pitchFamily="18" charset="0"/>
+                <a:cs typeface="Times New Roman" panose="02020603050405020304" pitchFamily="18" charset="0"/>
+              </a:endParaRPr>
+            </a:p>
+            <a:p>
+              <a:r>
+                <a:rPr lang="en-US" sz="3600" b="1" i="1" dirty="0">
+                  <a:solidFill>
+                    <a:schemeClr val="tx1"/>
+                  </a:solidFill>
+                  <a:latin typeface="Times New Roman" panose="02020603050405020304" pitchFamily="18" charset="0"/>
+                  <a:cs typeface="Times New Roman" panose="02020603050405020304" pitchFamily="18" charset="0"/>
+                </a:rPr>
+                <a:t>Reward Design</a:t>
+              </a:r>
+            </a:p>
+            <a:p>
+              <a:r>
+                <a:rPr lang="en-US" sz="3600" dirty="0">
+                  <a:solidFill>
+                    <a:schemeClr val="tx1"/>
+                  </a:solidFill>
+                  <a:latin typeface="Times New Roman" panose="02020603050405020304" pitchFamily="18" charset="0"/>
+                  <a:cs typeface="Times New Roman" panose="02020603050405020304" pitchFamily="18" charset="0"/>
+                </a:rPr>
+                <a:t>Reward = Pick Up Award - Distance Cost - No Pickup Penalty</a:t>
+              </a:r>
+            </a:p>
+            <a:p>
+              <a:pPr marL="571500" indent="-571500">
+                <a:buFont typeface="Arial" panose="020B0604020202020204" pitchFamily="34" charset="0"/>
+                <a:buChar char="•"/>
+              </a:pPr>
+              <a:r>
+                <a:rPr lang="en-US" sz="3600" dirty="0">
+                  <a:solidFill>
+                    <a:schemeClr val="tx1"/>
+                  </a:solidFill>
+                  <a:latin typeface="Times New Roman" panose="02020603050405020304" pitchFamily="18" charset="0"/>
+                  <a:cs typeface="Times New Roman" panose="02020603050405020304" pitchFamily="18" charset="0"/>
+                </a:rPr>
+                <a:t>Each vehicle will be awarded </a:t>
+              </a:r>
+              <a:r>
+                <a:rPr lang="en-US" sz="3600" i="1" dirty="0">
+                  <a:solidFill>
+                    <a:schemeClr val="tx1"/>
+                  </a:solidFill>
+                  <a:latin typeface="Times New Roman" panose="02020603050405020304" pitchFamily="18" charset="0"/>
+                  <a:cs typeface="Times New Roman" panose="02020603050405020304" pitchFamily="18" charset="0"/>
+                </a:rPr>
+                <a:t>R</a:t>
+              </a:r>
+              <a:r>
+                <a:rPr lang="en-US" sz="3600" dirty="0">
+                  <a:solidFill>
+                    <a:schemeClr val="tx1"/>
+                  </a:solidFill>
+                  <a:latin typeface="Times New Roman" panose="02020603050405020304" pitchFamily="18" charset="0"/>
+                  <a:cs typeface="Times New Roman" panose="02020603050405020304" pitchFamily="18" charset="0"/>
+                </a:rPr>
+                <a:t> points for each pick-up</a:t>
+              </a:r>
+            </a:p>
+            <a:p>
+              <a:pPr marL="571500" indent="-571500">
+                <a:buFont typeface="Arial" panose="020B0604020202020204" pitchFamily="34" charset="0"/>
+                <a:buChar char="•"/>
+              </a:pPr>
+              <a:r>
+                <a:rPr lang="en-US" sz="3600" dirty="0">
+                  <a:solidFill>
+                    <a:schemeClr val="tx1"/>
+                  </a:solidFill>
+                  <a:latin typeface="Times New Roman" panose="02020603050405020304" pitchFamily="18" charset="0"/>
+                  <a:cs typeface="Times New Roman" panose="02020603050405020304" pitchFamily="18" charset="0"/>
+                </a:rPr>
+                <a:t>Each vehicle will give a small cost when they are driving to a customer or rebalance</a:t>
+              </a:r>
+            </a:p>
+            <a:p>
+              <a:pPr marL="571500" indent="-571500">
+                <a:buFont typeface="Arial" panose="020B0604020202020204" pitchFamily="34" charset="0"/>
+                <a:buChar char="•"/>
+              </a:pPr>
+              <a:r>
+                <a:rPr lang="en-US" sz="3600" dirty="0">
+                  <a:solidFill>
+                    <a:schemeClr val="tx1"/>
+                  </a:solidFill>
+                  <a:latin typeface="Times New Roman" panose="02020603050405020304" pitchFamily="18" charset="0"/>
+                  <a:cs typeface="Times New Roman" panose="02020603050405020304" pitchFamily="18" charset="0"/>
+                </a:rPr>
+                <a:t>Each vehicle will be given a penalty </a:t>
+              </a:r>
+              <a:r>
+                <a:rPr lang="en-US" sz="3600" i="1" dirty="0">
+                  <a:solidFill>
+                    <a:schemeClr val="tx1"/>
+                  </a:solidFill>
+                  <a:latin typeface="Times New Roman" panose="02020603050405020304" pitchFamily="18" charset="0"/>
+                  <a:cs typeface="Times New Roman" panose="02020603050405020304" pitchFamily="18" charset="0"/>
+                </a:rPr>
+                <a:t>P</a:t>
+              </a:r>
+              <a:r>
+                <a:rPr lang="en-US" sz="3600" dirty="0">
+                  <a:solidFill>
+                    <a:schemeClr val="tx1"/>
+                  </a:solidFill>
+                  <a:latin typeface="Times New Roman" panose="02020603050405020304" pitchFamily="18" charset="0"/>
+                  <a:cs typeface="Times New Roman" panose="02020603050405020304" pitchFamily="18" charset="0"/>
+                </a:rPr>
+                <a:t> if there exist some requests that are not handled and yet the vehicle chooses an action other than a pick-up: </a:t>
+              </a:r>
+              <a:r>
+                <a:rPr lang="en-US" sz="3600" i="1" dirty="0">
+                  <a:solidFill>
+                    <a:schemeClr val="tx1"/>
+                  </a:solidFill>
+                  <a:latin typeface="Times New Roman" panose="02020603050405020304" pitchFamily="18" charset="0"/>
+                  <a:cs typeface="Times New Roman" panose="02020603050405020304" pitchFamily="18" charset="0"/>
+                </a:rPr>
+                <a:t>P</a:t>
+              </a:r>
+              <a:r>
+                <a:rPr lang="en-US" sz="3600" dirty="0">
+                  <a:solidFill>
+                    <a:schemeClr val="tx1"/>
+                  </a:solidFill>
+                  <a:latin typeface="Times New Roman" panose="02020603050405020304" pitchFamily="18" charset="0"/>
+                  <a:cs typeface="Times New Roman" panose="02020603050405020304" pitchFamily="18" charset="0"/>
+                </a:rPr>
+                <a:t> = </a:t>
+              </a:r>
+              <a:r>
+                <a:rPr lang="en-US" sz="3600" i="1" dirty="0">
+                  <a:solidFill>
+                    <a:schemeClr val="tx1"/>
+                  </a:solidFill>
+                  <a:latin typeface="Times New Roman" panose="02020603050405020304" pitchFamily="18" charset="0"/>
+                  <a:cs typeface="Times New Roman" panose="02020603050405020304" pitchFamily="18" charset="0"/>
+                </a:rPr>
+                <a:t>B</a:t>
+              </a:r>
+              <a:r>
+                <a:rPr lang="en-US" sz="3600" dirty="0">
+                  <a:solidFill>
+                    <a:schemeClr val="tx1"/>
+                  </a:solidFill>
+                  <a:latin typeface="Times New Roman" panose="02020603050405020304" pitchFamily="18" charset="0"/>
+                  <a:cs typeface="Times New Roman" panose="02020603050405020304" pitchFamily="18" charset="0"/>
+                </a:rPr>
+                <a:t> / (1 + </a:t>
+              </a:r>
+              <a:r>
+                <a:rPr lang="en-US" sz="3600" i="1" dirty="0">
+                  <a:solidFill>
+                    <a:schemeClr val="tx1"/>
+                  </a:solidFill>
+                  <a:latin typeface="Times New Roman" panose="02020603050405020304" pitchFamily="18" charset="0"/>
+                  <a:cs typeface="Times New Roman" panose="02020603050405020304" pitchFamily="18" charset="0"/>
+                </a:rPr>
+                <a:t>d</a:t>
+              </a:r>
+              <a:r>
+                <a:rPr lang="en-US" sz="3600" dirty="0">
+                  <a:solidFill>
+                    <a:schemeClr val="tx1"/>
+                  </a:solidFill>
+                  <a:latin typeface="Times New Roman" panose="02020603050405020304" pitchFamily="18" charset="0"/>
+                  <a:cs typeface="Times New Roman" panose="02020603050405020304" pitchFamily="18" charset="0"/>
+                </a:rPr>
+                <a:t>), where </a:t>
+              </a:r>
+              <a:r>
+                <a:rPr lang="en-US" sz="3600" i="1" dirty="0">
+                  <a:solidFill>
+                    <a:schemeClr val="tx1"/>
+                  </a:solidFill>
+                  <a:latin typeface="Times New Roman" panose="02020603050405020304" pitchFamily="18" charset="0"/>
+                  <a:cs typeface="Times New Roman" panose="02020603050405020304" pitchFamily="18" charset="0"/>
+                </a:rPr>
+                <a:t>B</a:t>
+              </a:r>
+              <a:r>
+                <a:rPr lang="en-US" sz="3600" dirty="0">
+                  <a:solidFill>
+                    <a:schemeClr val="tx1"/>
+                  </a:solidFill>
+                  <a:latin typeface="Times New Roman" panose="02020603050405020304" pitchFamily="18" charset="0"/>
+                  <a:cs typeface="Times New Roman" panose="02020603050405020304" pitchFamily="18" charset="0"/>
+                </a:rPr>
+                <a:t> is the penalty base constant, and </a:t>
+              </a:r>
+              <a:r>
+                <a:rPr lang="en-US" sz="3600" i="1" dirty="0">
+                  <a:solidFill>
+                    <a:schemeClr val="tx1"/>
+                  </a:solidFill>
+                  <a:latin typeface="Times New Roman" panose="02020603050405020304" pitchFamily="18" charset="0"/>
+                  <a:cs typeface="Times New Roman" panose="02020603050405020304" pitchFamily="18" charset="0"/>
+                </a:rPr>
+                <a:t>d</a:t>
+              </a:r>
+              <a:r>
+                <a:rPr lang="en-US" sz="3600" dirty="0">
+                  <a:solidFill>
+                    <a:schemeClr val="tx1"/>
+                  </a:solidFill>
+                  <a:latin typeface="Times New Roman" panose="02020603050405020304" pitchFamily="18" charset="0"/>
+                  <a:cs typeface="Times New Roman" panose="02020603050405020304" pitchFamily="18" charset="0"/>
+                </a:rPr>
+                <a:t> is the distance to the request</a:t>
+              </a:r>
+            </a:p>
+          </p:txBody>
+        </p:sp>
+      </p:grpSp>
+      <p:grpSp>
+        <p:nvGrpSpPr>
+          <p:cNvPr id="23" name="Group 22">
+            <a:extLst>
+              <a:ext uri="{FF2B5EF4-FFF2-40B4-BE49-F238E27FC236}">
+                <a16:creationId xmlns:a16="http://schemas.microsoft.com/office/drawing/2014/main" id="{3D22F5D8-6EEC-FE44-8CE6-A710692338AB}"/>
+              </a:ext>
+            </a:extLst>
+          </p:cNvPr>
+          <p:cNvGrpSpPr/>
+          <p:nvPr/>
+        </p:nvGrpSpPr>
+        <p:grpSpPr>
+          <a:xfrm>
+            <a:off x="12144136" y="4278650"/>
+            <a:ext cx="12293949" cy="14576910"/>
+            <a:chOff x="563232" y="4278651"/>
+            <a:chExt cx="10946274" cy="13005762"/>
+          </a:xfrm>
+        </p:grpSpPr>
+        <p:sp>
+          <p:nvSpPr>
+            <p:cNvPr id="24" name="Rectangle 23">
+              <a:extLst>
+                <a:ext uri="{FF2B5EF4-FFF2-40B4-BE49-F238E27FC236}">
+                  <a16:creationId xmlns:a16="http://schemas.microsoft.com/office/drawing/2014/main" id="{1E90C7D1-84B9-6C44-B748-81FBEC56011A}"/>
+                </a:ext>
+              </a:extLst>
+            </p:cNvPr>
+            <p:cNvSpPr/>
+            <p:nvPr/>
+          </p:nvSpPr>
+          <p:spPr>
+            <a:xfrm>
+              <a:off x="563232" y="4278651"/>
+              <a:ext cx="10946274" cy="1173882"/>
+            </a:xfrm>
+            <a:prstGeom prst="rect">
+              <a:avLst/>
+            </a:prstGeom>
+            <a:solidFill>
+              <a:srgbClr val="002B61"/>
+            </a:solidFill>
+          </p:spPr>
+          <p:style>
+            <a:lnRef idx="2">
+              <a:schemeClr val="accent1">
+                <a:shade val="50000"/>
+              </a:schemeClr>
+            </a:lnRef>
+            <a:fillRef idx="1">
+              <a:schemeClr val="accent1"/>
+            </a:fillRef>
+            <a:effectRef idx="0">
+              <a:schemeClr val="accent1"/>
+            </a:effectRef>
+            <a:fontRef idx="minor">
+              <a:schemeClr val="lt1"/>
+            </a:fontRef>
+          </p:style>
+          <p:txBody>
+            <a:bodyPr rtlCol="0" anchor="ctr" anchorCtr="0"/>
+            <a:lstStyle/>
+            <a:p>
+              <a:pPr algn="ctr"/>
+              <a:r>
+                <a:rPr lang="en-US" sz="5600" dirty="0">
+                  <a:solidFill>
+                    <a:schemeClr val="bg1"/>
+                  </a:solidFill>
+                  <a:latin typeface="Libre Baskerville" panose="02000000000000000000" pitchFamily="2" charset="0"/>
+                </a:rPr>
+                <a:t>Network</a:t>
+              </a:r>
+            </a:p>
+          </p:txBody>
+        </p:sp>
+        <p:sp>
+          <p:nvSpPr>
+            <p:cNvPr id="25" name="Rectangle 24">
+              <a:extLst>
+                <a:ext uri="{FF2B5EF4-FFF2-40B4-BE49-F238E27FC236}">
+                  <a16:creationId xmlns:a16="http://schemas.microsoft.com/office/drawing/2014/main" id="{94F4DBFD-6409-E74D-99A3-520B99CBA7C0}"/>
+                </a:ext>
+              </a:extLst>
+            </p:cNvPr>
+            <p:cNvSpPr/>
+            <p:nvPr/>
+          </p:nvSpPr>
+          <p:spPr>
+            <a:xfrm>
+              <a:off x="563232" y="5452533"/>
+              <a:ext cx="10946274" cy="11831880"/>
+            </a:xfrm>
+            <a:prstGeom prst="rect">
+              <a:avLst/>
+            </a:prstGeom>
+            <a:noFill/>
+          </p:spPr>
+          <p:style>
+            <a:lnRef idx="2">
+              <a:schemeClr val="accent1">
+                <a:shade val="50000"/>
+              </a:schemeClr>
+            </a:lnRef>
+            <a:fillRef idx="1">
+              <a:schemeClr val="accent1"/>
+            </a:fillRef>
+            <a:effectRef idx="0">
+              <a:schemeClr val="accent1"/>
+            </a:effectRef>
+            <a:fontRef idx="minor">
+              <a:schemeClr val="lt1"/>
+            </a:fontRef>
+          </p:style>
+          <p:txBody>
+            <a:bodyPr rtlCol="0" anchor="ctr" anchorCtr="0"/>
+            <a:lstStyle/>
+            <a:p>
+              <a:r>
+                <a:rPr lang="en-US" sz="3600" b="1" i="1" dirty="0">
+                  <a:solidFill>
+                    <a:schemeClr val="tx1"/>
+                  </a:solidFill>
+                  <a:latin typeface="Times New Roman" panose="02020603050405020304" pitchFamily="18" charset="0"/>
+                  <a:cs typeface="Times New Roman" panose="02020603050405020304" pitchFamily="18" charset="0"/>
+                </a:rPr>
+                <a:t>Deep Q-Learning</a:t>
+              </a:r>
+            </a:p>
+            <a:p>
+              <a:endParaRPr lang="en-US" sz="3600" dirty="0">
+                <a:solidFill>
+                  <a:schemeClr val="tx1"/>
+                </a:solidFill>
+                <a:latin typeface="Times New Roman" panose="02020603050405020304" pitchFamily="18" charset="0"/>
+                <a:cs typeface="Times New Roman" panose="02020603050405020304" pitchFamily="18" charset="0"/>
+              </a:endParaRPr>
+            </a:p>
+            <a:p>
+              <a:endParaRPr lang="en-US" sz="3600" dirty="0">
+                <a:solidFill>
+                  <a:schemeClr val="tx1"/>
+                </a:solidFill>
+                <a:latin typeface="Times New Roman" panose="02020603050405020304" pitchFamily="18" charset="0"/>
+                <a:cs typeface="Times New Roman" panose="02020603050405020304" pitchFamily="18" charset="0"/>
+              </a:endParaRPr>
+            </a:p>
+            <a:p>
+              <a:endParaRPr lang="en-US" sz="3600" dirty="0">
+                <a:solidFill>
+                  <a:schemeClr val="tx1"/>
+                </a:solidFill>
+                <a:latin typeface="Times New Roman" panose="02020603050405020304" pitchFamily="18" charset="0"/>
+                <a:cs typeface="Times New Roman" panose="02020603050405020304" pitchFamily="18" charset="0"/>
+              </a:endParaRPr>
+            </a:p>
+            <a:p>
+              <a:endParaRPr lang="en-US" sz="3600" dirty="0">
+                <a:solidFill>
+                  <a:schemeClr val="tx1"/>
+                </a:solidFill>
+                <a:latin typeface="Times New Roman" panose="02020603050405020304" pitchFamily="18" charset="0"/>
+                <a:cs typeface="Times New Roman" panose="02020603050405020304" pitchFamily="18" charset="0"/>
+              </a:endParaRPr>
+            </a:p>
+            <a:p>
+              <a:endParaRPr lang="en-US" sz="3600" dirty="0">
+                <a:solidFill>
+                  <a:schemeClr val="tx1"/>
+                </a:solidFill>
+                <a:latin typeface="Times New Roman" panose="02020603050405020304" pitchFamily="18" charset="0"/>
+                <a:cs typeface="Times New Roman" panose="02020603050405020304" pitchFamily="18" charset="0"/>
+              </a:endParaRPr>
+            </a:p>
+            <a:p>
+              <a:endParaRPr lang="en-US" sz="3600" dirty="0">
+                <a:solidFill>
+                  <a:schemeClr val="tx1"/>
+                </a:solidFill>
+                <a:latin typeface="Times New Roman" panose="02020603050405020304" pitchFamily="18" charset="0"/>
+                <a:cs typeface="Times New Roman" panose="02020603050405020304" pitchFamily="18" charset="0"/>
+              </a:endParaRPr>
+            </a:p>
+            <a:p>
+              <a:endParaRPr lang="en-US" sz="3600" dirty="0">
+                <a:solidFill>
+                  <a:schemeClr val="tx1"/>
+                </a:solidFill>
+                <a:latin typeface="Times New Roman" panose="02020603050405020304" pitchFamily="18" charset="0"/>
+                <a:cs typeface="Times New Roman" panose="02020603050405020304" pitchFamily="18" charset="0"/>
+              </a:endParaRPr>
+            </a:p>
+            <a:p>
+              <a:br>
+                <a:rPr lang="en-US" sz="3600" dirty="0">
+                  <a:solidFill>
+                    <a:schemeClr val="tx1"/>
+                  </a:solidFill>
+                  <a:latin typeface="Times New Roman" panose="02020603050405020304" pitchFamily="18" charset="0"/>
+                  <a:cs typeface="Times New Roman" panose="02020603050405020304" pitchFamily="18" charset="0"/>
+                </a:rPr>
+              </a:br>
+              <a:endParaRPr lang="en-US" sz="3600" dirty="0">
+                <a:solidFill>
+                  <a:schemeClr val="tx1"/>
+                </a:solidFill>
+                <a:latin typeface="Times New Roman" panose="02020603050405020304" pitchFamily="18" charset="0"/>
+                <a:cs typeface="Times New Roman" panose="02020603050405020304" pitchFamily="18" charset="0"/>
+              </a:endParaRPr>
+            </a:p>
+            <a:p>
+              <a:r>
+                <a:rPr lang="en-US" sz="3600" b="1" i="1" dirty="0">
+                  <a:solidFill>
+                    <a:schemeClr val="tx1"/>
+                  </a:solidFill>
+                  <a:latin typeface="Times New Roman" panose="02020603050405020304" pitchFamily="18" charset="0"/>
+                  <a:cs typeface="Times New Roman" panose="02020603050405020304" pitchFamily="18" charset="0"/>
+                </a:rPr>
+                <a:t>Actor-Critic</a:t>
+              </a:r>
+            </a:p>
+            <a:p>
+              <a:endParaRPr lang="en-US" sz="3600" dirty="0">
+                <a:solidFill>
+                  <a:schemeClr val="tx1"/>
+                </a:solidFill>
+                <a:latin typeface="Times New Roman" panose="02020603050405020304" pitchFamily="18" charset="0"/>
+                <a:cs typeface="Times New Roman" panose="02020603050405020304" pitchFamily="18" charset="0"/>
+              </a:endParaRPr>
+            </a:p>
+            <a:p>
+              <a:endParaRPr lang="en-US" sz="3600" dirty="0">
+                <a:solidFill>
+                  <a:schemeClr val="tx1"/>
+                </a:solidFill>
+                <a:latin typeface="Times New Roman" panose="02020603050405020304" pitchFamily="18" charset="0"/>
+                <a:cs typeface="Times New Roman" panose="02020603050405020304" pitchFamily="18" charset="0"/>
+              </a:endParaRPr>
+            </a:p>
+            <a:p>
+              <a:endParaRPr lang="en-US" sz="3600" dirty="0">
+                <a:solidFill>
+                  <a:schemeClr val="tx1"/>
+                </a:solidFill>
+                <a:latin typeface="Times New Roman" panose="02020603050405020304" pitchFamily="18" charset="0"/>
+                <a:cs typeface="Times New Roman" panose="02020603050405020304" pitchFamily="18" charset="0"/>
+              </a:endParaRPr>
+            </a:p>
+            <a:p>
+              <a:endParaRPr lang="en-US" sz="3600" dirty="0">
+                <a:solidFill>
+                  <a:schemeClr val="tx1"/>
+                </a:solidFill>
+                <a:latin typeface="Times New Roman" panose="02020603050405020304" pitchFamily="18" charset="0"/>
+                <a:cs typeface="Times New Roman" panose="02020603050405020304" pitchFamily="18" charset="0"/>
+              </a:endParaRPr>
+            </a:p>
+            <a:p>
+              <a:endParaRPr lang="en-US" sz="3600" dirty="0">
+                <a:solidFill>
+                  <a:schemeClr val="tx1"/>
+                </a:solidFill>
+                <a:latin typeface="Times New Roman" panose="02020603050405020304" pitchFamily="18" charset="0"/>
+                <a:cs typeface="Times New Roman" panose="02020603050405020304" pitchFamily="18" charset="0"/>
+              </a:endParaRPr>
+            </a:p>
+            <a:p>
+              <a:endParaRPr lang="en-US" sz="3600" dirty="0">
+                <a:solidFill>
+                  <a:schemeClr val="tx1"/>
+                </a:solidFill>
+                <a:latin typeface="Times New Roman" panose="02020603050405020304" pitchFamily="18" charset="0"/>
+                <a:cs typeface="Times New Roman" panose="02020603050405020304" pitchFamily="18" charset="0"/>
+              </a:endParaRPr>
+            </a:p>
+            <a:p>
+              <a:endParaRPr lang="en-US" sz="3600" dirty="0">
+                <a:solidFill>
+                  <a:schemeClr val="tx1"/>
+                </a:solidFill>
+                <a:latin typeface="Times New Roman" panose="02020603050405020304" pitchFamily="18" charset="0"/>
+                <a:cs typeface="Times New Roman" panose="02020603050405020304" pitchFamily="18" charset="0"/>
+              </a:endParaRPr>
+            </a:p>
+            <a:p>
+              <a:endParaRPr lang="en-US" sz="3600" dirty="0">
+                <a:solidFill>
+                  <a:schemeClr val="tx1"/>
+                </a:solidFill>
+                <a:latin typeface="Times New Roman" panose="02020603050405020304" pitchFamily="18" charset="0"/>
+                <a:cs typeface="Times New Roman" panose="02020603050405020304" pitchFamily="18" charset="0"/>
+              </a:endParaRPr>
+            </a:p>
+            <a:p>
+              <a:endParaRPr lang="en-US" sz="3600" dirty="0">
+                <a:solidFill>
+                  <a:schemeClr val="tx1"/>
+                </a:solidFill>
+                <a:latin typeface="Times New Roman" panose="02020603050405020304" pitchFamily="18" charset="0"/>
+                <a:cs typeface="Times New Roman" panose="02020603050405020304" pitchFamily="18" charset="0"/>
+              </a:endParaRPr>
+            </a:p>
+            <a:p>
+              <a:endParaRPr lang="en-US" sz="3600" dirty="0">
+                <a:solidFill>
+                  <a:schemeClr val="tx1"/>
+                </a:solidFill>
+                <a:latin typeface="Times New Roman" panose="02020603050405020304" pitchFamily="18" charset="0"/>
+                <a:cs typeface="Times New Roman" panose="02020603050405020304" pitchFamily="18" charset="0"/>
+              </a:endParaRPr>
+            </a:p>
+            <a:p>
+              <a:endParaRPr lang="en-US" sz="3600" dirty="0">
+                <a:solidFill>
+                  <a:schemeClr val="tx1"/>
+                </a:solidFill>
+                <a:latin typeface="Times New Roman" panose="02020603050405020304" pitchFamily="18" charset="0"/>
+                <a:cs typeface="Times New Roman" panose="02020603050405020304" pitchFamily="18" charset="0"/>
+              </a:endParaRPr>
+            </a:p>
+            <a:p>
+              <a:endParaRPr lang="en-US" sz="3600" dirty="0">
+                <a:solidFill>
+                  <a:schemeClr val="tx1"/>
+                </a:solidFill>
+                <a:latin typeface="Times New Roman" panose="02020603050405020304" pitchFamily="18" charset="0"/>
+                <a:cs typeface="Times New Roman" panose="02020603050405020304" pitchFamily="18" charset="0"/>
+              </a:endParaRPr>
+            </a:p>
+          </p:txBody>
+        </p:sp>
+      </p:grpSp>
+      <p:pic>
+        <p:nvPicPr>
+          <p:cNvPr id="27" name="Picture 26">
+            <a:extLst>
+              <a:ext uri="{FF2B5EF4-FFF2-40B4-BE49-F238E27FC236}">
+                <a16:creationId xmlns:a16="http://schemas.microsoft.com/office/drawing/2014/main" id="{2E577FD5-50AC-3641-A311-048BCCBDEBAF}"/>
+              </a:ext>
+            </a:extLst>
+          </p:cNvPr>
+          <p:cNvPicPr>
+            <a:picLocks noChangeAspect="1"/>
+          </p:cNvPicPr>
+          <p:nvPr/>
+        </p:nvPicPr>
+        <p:blipFill>
+          <a:blip r:embed="rId4"/>
+          <a:stretch>
+            <a:fillRect/>
+          </a:stretch>
+        </p:blipFill>
+        <p:spPr>
+          <a:xfrm>
+            <a:off x="12330910" y="6570115"/>
+            <a:ext cx="11914180" cy="3867430"/>
+          </a:xfrm>
+          <a:prstGeom prst="rect">
+            <a:avLst/>
+          </a:prstGeom>
+        </p:spPr>
+      </p:pic>
+      <p:pic>
+        <p:nvPicPr>
+          <p:cNvPr id="31" name="Picture 30">
+            <a:extLst>
+              <a:ext uri="{FF2B5EF4-FFF2-40B4-BE49-F238E27FC236}">
+                <a16:creationId xmlns:a16="http://schemas.microsoft.com/office/drawing/2014/main" id="{9856B53A-7341-BE46-9CAA-349AB277C9D8}"/>
+              </a:ext>
+            </a:extLst>
+          </p:cNvPr>
+          <p:cNvPicPr>
+            <a:picLocks noChangeAspect="1"/>
+          </p:cNvPicPr>
+          <p:nvPr/>
+        </p:nvPicPr>
+        <p:blipFill>
+          <a:blip r:embed="rId5"/>
+          <a:stretch>
+            <a:fillRect/>
+          </a:stretch>
+        </p:blipFill>
+        <p:spPr>
+          <a:xfrm>
+            <a:off x="12330910" y="12224951"/>
+            <a:ext cx="12101446" cy="5598234"/>
+          </a:xfrm>
+          <a:prstGeom prst="rect">
+            <a:avLst/>
+          </a:prstGeom>
+        </p:spPr>
+      </p:pic>
+      <p:grpSp>
+        <p:nvGrpSpPr>
+          <p:cNvPr id="32" name="Group 31">
+            <a:extLst>
+              <a:ext uri="{FF2B5EF4-FFF2-40B4-BE49-F238E27FC236}">
+                <a16:creationId xmlns:a16="http://schemas.microsoft.com/office/drawing/2014/main" id="{378FE2BF-4F61-BC42-AC3A-046C5DEF80CB}"/>
+              </a:ext>
+            </a:extLst>
+          </p:cNvPr>
+          <p:cNvGrpSpPr/>
+          <p:nvPr/>
+        </p:nvGrpSpPr>
+        <p:grpSpPr>
+          <a:xfrm>
+            <a:off x="12144135" y="19329749"/>
+            <a:ext cx="12288217" cy="7407042"/>
+            <a:chOff x="563232" y="4278651"/>
+            <a:chExt cx="10946274" cy="6608686"/>
+          </a:xfrm>
+        </p:grpSpPr>
+        <p:sp>
+          <p:nvSpPr>
+            <p:cNvPr id="33" name="Rectangle 32">
+              <a:extLst>
+                <a:ext uri="{FF2B5EF4-FFF2-40B4-BE49-F238E27FC236}">
+                  <a16:creationId xmlns:a16="http://schemas.microsoft.com/office/drawing/2014/main" id="{4366437E-6E0B-6441-A733-34D89219DA4D}"/>
+                </a:ext>
+              </a:extLst>
+            </p:cNvPr>
+            <p:cNvSpPr/>
+            <p:nvPr/>
+          </p:nvSpPr>
+          <p:spPr>
+            <a:xfrm>
+              <a:off x="563232" y="4278651"/>
+              <a:ext cx="10946274" cy="1173882"/>
+            </a:xfrm>
+            <a:prstGeom prst="rect">
+              <a:avLst/>
+            </a:prstGeom>
+            <a:solidFill>
+              <a:srgbClr val="002B61"/>
+            </a:solidFill>
+          </p:spPr>
+          <p:style>
+            <a:lnRef idx="2">
+              <a:schemeClr val="accent1">
+                <a:shade val="50000"/>
+              </a:schemeClr>
+            </a:lnRef>
+            <a:fillRef idx="1">
+              <a:schemeClr val="accent1"/>
+            </a:fillRef>
+            <a:effectRef idx="0">
+              <a:schemeClr val="accent1"/>
+            </a:effectRef>
+            <a:fontRef idx="minor">
+              <a:schemeClr val="lt1"/>
+            </a:fontRef>
+          </p:style>
+          <p:txBody>
+            <a:bodyPr rtlCol="0" anchor="ctr" anchorCtr="0"/>
+            <a:lstStyle/>
+            <a:p>
+              <a:pPr algn="ctr"/>
+              <a:r>
+                <a:rPr lang="en-US" sz="5600" dirty="0">
+                  <a:solidFill>
+                    <a:schemeClr val="bg1"/>
+                  </a:solidFill>
+                  <a:latin typeface="Libre Baskerville" panose="02000000000000000000" pitchFamily="2" charset="0"/>
+                </a:rPr>
+                <a:t>Results</a:t>
+              </a:r>
+            </a:p>
+          </p:txBody>
+        </p:sp>
+        <p:sp>
+          <p:nvSpPr>
+            <p:cNvPr id="34" name="Rectangle 33">
+              <a:extLst>
+                <a:ext uri="{FF2B5EF4-FFF2-40B4-BE49-F238E27FC236}">
+                  <a16:creationId xmlns:a16="http://schemas.microsoft.com/office/drawing/2014/main" id="{A223DEFA-CD35-8741-9837-6B419BA39BC1}"/>
+                </a:ext>
+              </a:extLst>
+            </p:cNvPr>
+            <p:cNvSpPr/>
+            <p:nvPr/>
+          </p:nvSpPr>
+          <p:spPr>
+            <a:xfrm>
+              <a:off x="563232" y="5452532"/>
+              <a:ext cx="10946274" cy="5434805"/>
+            </a:xfrm>
+            <a:prstGeom prst="rect">
+              <a:avLst/>
+            </a:prstGeom>
+            <a:noFill/>
+          </p:spPr>
+          <p:style>
+            <a:lnRef idx="2">
+              <a:schemeClr val="accent1">
+                <a:shade val="50000"/>
+              </a:schemeClr>
+            </a:lnRef>
+            <a:fillRef idx="1">
+              <a:schemeClr val="accent1"/>
+            </a:fillRef>
+            <a:effectRef idx="0">
+              <a:schemeClr val="accent1"/>
+            </a:effectRef>
+            <a:fontRef idx="minor">
+              <a:schemeClr val="lt1"/>
+            </a:fontRef>
+          </p:style>
+          <p:txBody>
+            <a:bodyPr rtlCol="0" anchor="ctr" anchorCtr="0"/>
+            <a:lstStyle/>
+            <a:p>
+              <a:r>
+                <a:rPr lang="en-US" sz="3600" dirty="0">
+                  <a:solidFill>
+                    <a:schemeClr val="tx1"/>
+                  </a:solidFill>
+                  <a:latin typeface="Times New Roman" panose="02020603050405020304" pitchFamily="18" charset="0"/>
+                  <a:cs typeface="Times New Roman" panose="02020603050405020304" pitchFamily="18" charset="0"/>
+                </a:rPr>
+                <a:t>With higher speed and less time spent in parking, autonomous mobility-on-demand (</a:t>
+              </a:r>
+              <a:r>
+                <a:rPr lang="en-US" sz="3600" dirty="0" err="1">
+                  <a:solidFill>
+                    <a:schemeClr val="tx1"/>
+                  </a:solidFill>
+                  <a:latin typeface="Times New Roman" panose="02020603050405020304" pitchFamily="18" charset="0"/>
+                  <a:cs typeface="Times New Roman" panose="02020603050405020304" pitchFamily="18" charset="0"/>
+                </a:rPr>
+                <a:t>AMoD</a:t>
+              </a:r>
+              <a:r>
+                <a:rPr lang="en-US" sz="3600" dirty="0">
+                  <a:solidFill>
+                    <a:schemeClr val="tx1"/>
+                  </a:solidFill>
+                  <a:latin typeface="Times New Roman" panose="02020603050405020304" pitchFamily="18" charset="0"/>
+                  <a:cs typeface="Times New Roman" panose="02020603050405020304" pitchFamily="18" charset="0"/>
+                </a:rPr>
+                <a:t>) system is predicted to be the solution for the future to reduce the pressure from urban mobility. In this project, we adopts Deep Q-Learning network (DQN) of the previous work and Actor-Critic Network (A2C), and creates new new states and actions, which are more close to the actual situation. The combination of the modified networks and the novel variables make the </a:t>
+              </a:r>
+              <a:r>
+                <a:rPr lang="en-US" sz="3600" dirty="0" err="1">
+                  <a:solidFill>
+                    <a:schemeClr val="tx1"/>
+                  </a:solidFill>
+                  <a:latin typeface="Times New Roman" panose="02020603050405020304" pitchFamily="18" charset="0"/>
+                  <a:cs typeface="Times New Roman" panose="02020603050405020304" pitchFamily="18" charset="0"/>
+                </a:rPr>
+                <a:t>AMoD</a:t>
+              </a:r>
+              <a:r>
+                <a:rPr lang="en-US" sz="3600" dirty="0">
+                  <a:solidFill>
+                    <a:schemeClr val="tx1"/>
+                  </a:solidFill>
+                  <a:latin typeface="Times New Roman" panose="02020603050405020304" pitchFamily="18" charset="0"/>
+                  <a:cs typeface="Times New Roman" panose="02020603050405020304" pitchFamily="18" charset="0"/>
+                </a:rPr>
+                <a:t> system more reliable.</a:t>
+              </a:r>
+            </a:p>
+          </p:txBody>
+        </p:sp>
+      </p:grpSp>
+      <p:grpSp>
+        <p:nvGrpSpPr>
+          <p:cNvPr id="35" name="Group 34">
+            <a:extLst>
+              <a:ext uri="{FF2B5EF4-FFF2-40B4-BE49-F238E27FC236}">
+                <a16:creationId xmlns:a16="http://schemas.microsoft.com/office/drawing/2014/main" id="{6CC9F81A-42DE-2B4A-B983-B305D5CC6B3B}"/>
+              </a:ext>
+            </a:extLst>
+          </p:cNvPr>
+          <p:cNvGrpSpPr/>
+          <p:nvPr/>
+        </p:nvGrpSpPr>
+        <p:grpSpPr>
+          <a:xfrm>
+            <a:off x="25072742" y="4330635"/>
+            <a:ext cx="11201764" cy="10247960"/>
+            <a:chOff x="563232" y="4278651"/>
+            <a:chExt cx="10946274" cy="9143400"/>
+          </a:xfrm>
+        </p:grpSpPr>
+        <p:sp>
+          <p:nvSpPr>
+            <p:cNvPr id="36" name="Rectangle 35">
+              <a:extLst>
+                <a:ext uri="{FF2B5EF4-FFF2-40B4-BE49-F238E27FC236}">
+                  <a16:creationId xmlns:a16="http://schemas.microsoft.com/office/drawing/2014/main" id="{3E29C88A-72F9-8B4D-8D73-BC0BC74D20A9}"/>
+                </a:ext>
+              </a:extLst>
+            </p:cNvPr>
+            <p:cNvSpPr/>
+            <p:nvPr/>
+          </p:nvSpPr>
+          <p:spPr>
+            <a:xfrm>
+              <a:off x="563232" y="4278651"/>
+              <a:ext cx="10946274" cy="1173882"/>
+            </a:xfrm>
+            <a:prstGeom prst="rect">
+              <a:avLst/>
+            </a:prstGeom>
+            <a:solidFill>
+              <a:srgbClr val="002B61"/>
+            </a:solidFill>
+          </p:spPr>
+          <p:style>
+            <a:lnRef idx="2">
+              <a:schemeClr val="accent1">
+                <a:shade val="50000"/>
+              </a:schemeClr>
+            </a:lnRef>
+            <a:fillRef idx="1">
+              <a:schemeClr val="accent1"/>
+            </a:fillRef>
+            <a:effectRef idx="0">
+              <a:schemeClr val="accent1"/>
+            </a:effectRef>
+            <a:fontRef idx="minor">
+              <a:schemeClr val="lt1"/>
+            </a:fontRef>
+          </p:style>
+          <p:txBody>
+            <a:bodyPr rtlCol="0" anchor="ctr" anchorCtr="0"/>
+            <a:lstStyle/>
+            <a:p>
+              <a:pPr algn="ctr"/>
+              <a:r>
+                <a:rPr lang="en-US" sz="5600" dirty="0">
+                  <a:solidFill>
+                    <a:schemeClr val="bg1"/>
+                  </a:solidFill>
+                  <a:latin typeface="Libre Baskerville" panose="02000000000000000000" pitchFamily="2" charset="0"/>
+                </a:rPr>
+                <a:t>Results</a:t>
+              </a:r>
+            </a:p>
+          </p:txBody>
+        </p:sp>
+        <p:sp>
+          <p:nvSpPr>
+            <p:cNvPr id="37" name="Rectangle 36">
+              <a:extLst>
+                <a:ext uri="{FF2B5EF4-FFF2-40B4-BE49-F238E27FC236}">
+                  <a16:creationId xmlns:a16="http://schemas.microsoft.com/office/drawing/2014/main" id="{A909054C-DC07-D24B-81D2-4F078ED2D23C}"/>
+                </a:ext>
+              </a:extLst>
+            </p:cNvPr>
+            <p:cNvSpPr/>
+            <p:nvPr/>
+          </p:nvSpPr>
+          <p:spPr>
+            <a:xfrm>
+              <a:off x="563232" y="5452532"/>
+              <a:ext cx="10946274" cy="7969519"/>
+            </a:xfrm>
+            <a:prstGeom prst="rect">
+              <a:avLst/>
+            </a:prstGeom>
+            <a:noFill/>
+          </p:spPr>
+          <p:style>
+            <a:lnRef idx="2">
+              <a:schemeClr val="accent1">
+                <a:shade val="50000"/>
+              </a:schemeClr>
+            </a:lnRef>
+            <a:fillRef idx="1">
+              <a:schemeClr val="accent1"/>
+            </a:fillRef>
+            <a:effectRef idx="0">
+              <a:schemeClr val="accent1"/>
+            </a:effectRef>
+            <a:fontRef idx="minor">
+              <a:schemeClr val="lt1"/>
+            </a:fontRef>
+          </p:style>
+          <p:txBody>
+            <a:bodyPr rtlCol="0" anchor="ctr" anchorCtr="0"/>
+            <a:lstStyle/>
+            <a:p>
+              <a:r>
+                <a:rPr lang="en-US" sz="3600" dirty="0">
+                  <a:solidFill>
+                    <a:schemeClr val="tx1"/>
+                  </a:solidFill>
+                  <a:latin typeface="Times New Roman" panose="02020603050405020304" pitchFamily="18" charset="0"/>
+                  <a:cs typeface="Times New Roman" panose="02020603050405020304" pitchFamily="18" charset="0"/>
+                </a:rPr>
+                <a:t>With higher speed and less time spent in parking, autonomous mobility-on-demand (</a:t>
+              </a:r>
+              <a:r>
+                <a:rPr lang="en-US" sz="3600" dirty="0" err="1">
+                  <a:solidFill>
+                    <a:schemeClr val="tx1"/>
+                  </a:solidFill>
+                  <a:latin typeface="Times New Roman" panose="02020603050405020304" pitchFamily="18" charset="0"/>
+                  <a:cs typeface="Times New Roman" panose="02020603050405020304" pitchFamily="18" charset="0"/>
+                </a:rPr>
+                <a:t>AMoD</a:t>
+              </a:r>
+              <a:r>
+                <a:rPr lang="en-US" sz="3600" dirty="0">
+                  <a:solidFill>
+                    <a:schemeClr val="tx1"/>
+                  </a:solidFill>
+                  <a:latin typeface="Times New Roman" panose="02020603050405020304" pitchFamily="18" charset="0"/>
+                  <a:cs typeface="Times New Roman" panose="02020603050405020304" pitchFamily="18" charset="0"/>
+                </a:rPr>
+                <a:t>) system is predicted to be the solution for the future to reduce the pressure from urban mobility. In this project, we adopts Deep Q-Learning network (DQN) of the previous work and Actor-Critic Network (A2C), and creates new new states and actions, which are more close to the actual situation. The combination of the modified networks and the novel variables make the </a:t>
+              </a:r>
+              <a:r>
+                <a:rPr lang="en-US" sz="3600" dirty="0" err="1">
+                  <a:solidFill>
+                    <a:schemeClr val="tx1"/>
+                  </a:solidFill>
+                  <a:latin typeface="Times New Roman" panose="02020603050405020304" pitchFamily="18" charset="0"/>
+                  <a:cs typeface="Times New Roman" panose="02020603050405020304" pitchFamily="18" charset="0"/>
+                </a:rPr>
+                <a:t>AMoD</a:t>
+              </a:r>
+              <a:r>
+                <a:rPr lang="en-US" sz="3600" dirty="0">
+                  <a:solidFill>
+                    <a:schemeClr val="tx1"/>
+                  </a:solidFill>
+                  <a:latin typeface="Times New Roman" panose="02020603050405020304" pitchFamily="18" charset="0"/>
+                  <a:cs typeface="Times New Roman" panose="02020603050405020304" pitchFamily="18" charset="0"/>
+                </a:rPr>
+                <a:t> system more reliable.</a:t>
+              </a:r>
+            </a:p>
+          </p:txBody>
+        </p:sp>
+      </p:grpSp>
+      <p:grpSp>
+        <p:nvGrpSpPr>
+          <p:cNvPr id="38" name="Group 37">
+            <a:extLst>
+              <a:ext uri="{FF2B5EF4-FFF2-40B4-BE49-F238E27FC236}">
+                <a16:creationId xmlns:a16="http://schemas.microsoft.com/office/drawing/2014/main" id="{6C2ED0E6-72A3-8E40-9E71-02F2723B8953}"/>
+              </a:ext>
+            </a:extLst>
+          </p:cNvPr>
+          <p:cNvGrpSpPr/>
+          <p:nvPr/>
+        </p:nvGrpSpPr>
+        <p:grpSpPr>
+          <a:xfrm>
+            <a:off x="25072741" y="14863614"/>
+            <a:ext cx="11201764" cy="3995928"/>
+            <a:chOff x="563232" y="4278651"/>
+            <a:chExt cx="10946274" cy="4791269"/>
+          </a:xfrm>
+        </p:grpSpPr>
+        <p:sp>
+          <p:nvSpPr>
+            <p:cNvPr id="39" name="Rectangle 38">
+              <a:extLst>
+                <a:ext uri="{FF2B5EF4-FFF2-40B4-BE49-F238E27FC236}">
+                  <a16:creationId xmlns:a16="http://schemas.microsoft.com/office/drawing/2014/main" id="{9248973B-637D-AB4C-A34B-DF98136AF12A}"/>
+                </a:ext>
+              </a:extLst>
+            </p:cNvPr>
+            <p:cNvSpPr/>
+            <p:nvPr/>
+          </p:nvSpPr>
+          <p:spPr>
+            <a:xfrm>
+              <a:off x="563232" y="4278651"/>
+              <a:ext cx="10946274" cy="1578816"/>
+            </a:xfrm>
+            <a:prstGeom prst="rect">
+              <a:avLst/>
+            </a:prstGeom>
+            <a:solidFill>
+              <a:srgbClr val="002B61"/>
+            </a:solidFill>
+          </p:spPr>
+          <p:style>
+            <a:lnRef idx="2">
+              <a:schemeClr val="accent1">
+                <a:shade val="50000"/>
+              </a:schemeClr>
+            </a:lnRef>
+            <a:fillRef idx="1">
+              <a:schemeClr val="accent1"/>
+            </a:fillRef>
+            <a:effectRef idx="0">
+              <a:schemeClr val="accent1"/>
+            </a:effectRef>
+            <a:fontRef idx="minor">
+              <a:schemeClr val="lt1"/>
+            </a:fontRef>
+          </p:style>
+          <p:txBody>
+            <a:bodyPr rtlCol="0" anchor="ctr" anchorCtr="0"/>
+            <a:lstStyle/>
+            <a:p>
+              <a:pPr algn="ctr"/>
+              <a:r>
+                <a:rPr lang="en-US" sz="5600" dirty="0">
+                  <a:solidFill>
+                    <a:schemeClr val="bg1"/>
+                  </a:solidFill>
+                  <a:latin typeface="Libre Baskerville" panose="02000000000000000000" pitchFamily="2" charset="0"/>
+                </a:rPr>
+                <a:t>Conclusion</a:t>
+              </a:r>
+            </a:p>
+          </p:txBody>
+        </p:sp>
+        <p:sp>
+          <p:nvSpPr>
+            <p:cNvPr id="40" name="Rectangle 39">
+              <a:extLst>
+                <a:ext uri="{FF2B5EF4-FFF2-40B4-BE49-F238E27FC236}">
+                  <a16:creationId xmlns:a16="http://schemas.microsoft.com/office/drawing/2014/main" id="{D6448C27-822D-9846-8577-875FE406B8AD}"/>
+                </a:ext>
+              </a:extLst>
+            </p:cNvPr>
+            <p:cNvSpPr/>
+            <p:nvPr/>
+          </p:nvSpPr>
+          <p:spPr>
+            <a:xfrm>
+              <a:off x="563232" y="5857467"/>
+              <a:ext cx="10946274" cy="3212453"/>
+            </a:xfrm>
+            <a:prstGeom prst="rect">
+              <a:avLst/>
+            </a:prstGeom>
+            <a:noFill/>
+          </p:spPr>
+          <p:style>
+            <a:lnRef idx="2">
+              <a:schemeClr val="accent1">
+                <a:shade val="50000"/>
+              </a:schemeClr>
+            </a:lnRef>
+            <a:fillRef idx="1">
+              <a:schemeClr val="accent1"/>
+            </a:fillRef>
+            <a:effectRef idx="0">
+              <a:schemeClr val="accent1"/>
+            </a:effectRef>
+            <a:fontRef idx="minor">
+              <a:schemeClr val="lt1"/>
+            </a:fontRef>
+          </p:style>
+          <p:txBody>
+            <a:bodyPr rtlCol="0" anchor="ctr" anchorCtr="0"/>
+            <a:lstStyle/>
+            <a:p>
+              <a:r>
+                <a:rPr lang="en-US" sz="3600" dirty="0">
+                  <a:solidFill>
+                    <a:schemeClr val="tx1"/>
+                  </a:solidFill>
+                  <a:latin typeface="Times New Roman" panose="02020603050405020304" pitchFamily="18" charset="0"/>
+                  <a:cs typeface="Times New Roman" panose="02020603050405020304" pitchFamily="18" charset="0"/>
+                </a:rPr>
+                <a:t>Our work has demonstrated that given a well-rounded policy, the Reinforcement Learning method is an efficient tool in solving </a:t>
+              </a:r>
+              <a:r>
+                <a:rPr lang="en-US" sz="3600" dirty="0" err="1">
+                  <a:solidFill>
+                    <a:schemeClr val="tx1"/>
+                  </a:solidFill>
+                  <a:latin typeface="Times New Roman" panose="02020603050405020304" pitchFamily="18" charset="0"/>
+                  <a:cs typeface="Times New Roman" panose="02020603050405020304" pitchFamily="18" charset="0"/>
+                </a:rPr>
+                <a:t>AMoD</a:t>
+              </a:r>
+              <a:r>
+                <a:rPr lang="en-US" sz="3600" dirty="0">
+                  <a:solidFill>
+                    <a:schemeClr val="tx1"/>
+                  </a:solidFill>
+                  <a:latin typeface="Times New Roman" panose="02020603050405020304" pitchFamily="18" charset="0"/>
+                  <a:cs typeface="Times New Roman" panose="02020603050405020304" pitchFamily="18" charset="0"/>
+                </a:rPr>
+                <a:t>-related problems. </a:t>
+              </a:r>
+            </a:p>
+          </p:txBody>
+        </p:sp>
+      </p:grpSp>
+      <p:grpSp>
+        <p:nvGrpSpPr>
+          <p:cNvPr id="41" name="Group 40">
+            <a:extLst>
+              <a:ext uri="{FF2B5EF4-FFF2-40B4-BE49-F238E27FC236}">
+                <a16:creationId xmlns:a16="http://schemas.microsoft.com/office/drawing/2014/main" id="{B6D33243-FD3D-3C46-B950-DA731BC881C1}"/>
+              </a:ext>
+            </a:extLst>
+          </p:cNvPr>
+          <p:cNvGrpSpPr/>
+          <p:nvPr/>
+        </p:nvGrpSpPr>
+        <p:grpSpPr>
+          <a:xfrm>
+            <a:off x="25072741" y="19329749"/>
+            <a:ext cx="11201764" cy="7407042"/>
+            <a:chOff x="563232" y="4278651"/>
+            <a:chExt cx="10946274" cy="4791269"/>
+          </a:xfrm>
+        </p:grpSpPr>
+        <p:sp>
+          <p:nvSpPr>
+            <p:cNvPr id="42" name="Rectangle 41">
+              <a:extLst>
+                <a:ext uri="{FF2B5EF4-FFF2-40B4-BE49-F238E27FC236}">
+                  <a16:creationId xmlns:a16="http://schemas.microsoft.com/office/drawing/2014/main" id="{6D6E69DC-EEFF-E44B-B58B-4CBFEB383122}"/>
+                </a:ext>
+              </a:extLst>
+            </p:cNvPr>
+            <p:cNvSpPr/>
+            <p:nvPr/>
+          </p:nvSpPr>
+          <p:spPr>
+            <a:xfrm>
+              <a:off x="563232" y="4278651"/>
+              <a:ext cx="10946274" cy="851059"/>
+            </a:xfrm>
+            <a:prstGeom prst="rect">
+              <a:avLst/>
+            </a:prstGeom>
+            <a:solidFill>
+              <a:srgbClr val="002B61"/>
+            </a:solidFill>
+          </p:spPr>
+          <p:style>
+            <a:lnRef idx="2">
+              <a:schemeClr val="accent1">
+                <a:shade val="50000"/>
+              </a:schemeClr>
+            </a:lnRef>
+            <a:fillRef idx="1">
+              <a:schemeClr val="accent1"/>
+            </a:fillRef>
+            <a:effectRef idx="0">
+              <a:schemeClr val="accent1"/>
+            </a:effectRef>
+            <a:fontRef idx="minor">
+              <a:schemeClr val="lt1"/>
+            </a:fontRef>
+          </p:style>
+          <p:txBody>
+            <a:bodyPr rtlCol="0" anchor="ctr" anchorCtr="0"/>
+            <a:lstStyle/>
+            <a:p>
+              <a:pPr algn="ctr"/>
+              <a:r>
+                <a:rPr lang="en-US" sz="5600" dirty="0">
+                  <a:solidFill>
+                    <a:schemeClr val="bg1"/>
+                  </a:solidFill>
+                  <a:latin typeface="Libre Baskerville" panose="02000000000000000000" pitchFamily="2" charset="0"/>
+                </a:rPr>
+                <a:t>References</a:t>
+              </a:r>
+            </a:p>
+          </p:txBody>
+        </p:sp>
+        <p:sp>
+          <p:nvSpPr>
+            <p:cNvPr id="43" name="Rectangle 42">
+              <a:extLst>
+                <a:ext uri="{FF2B5EF4-FFF2-40B4-BE49-F238E27FC236}">
+                  <a16:creationId xmlns:a16="http://schemas.microsoft.com/office/drawing/2014/main" id="{338A44F8-B5E7-C74D-9079-986D2EB8129F}"/>
+                </a:ext>
+              </a:extLst>
+            </p:cNvPr>
+            <p:cNvSpPr/>
+            <p:nvPr/>
+          </p:nvSpPr>
+          <p:spPr>
+            <a:xfrm>
+              <a:off x="563232" y="5129710"/>
+              <a:ext cx="10946274" cy="3940210"/>
+            </a:xfrm>
+            <a:prstGeom prst="rect">
+              <a:avLst/>
+            </a:prstGeom>
+            <a:noFill/>
+          </p:spPr>
+          <p:style>
+            <a:lnRef idx="2">
+              <a:schemeClr val="accent1">
+                <a:shade val="50000"/>
+              </a:schemeClr>
+            </a:lnRef>
+            <a:fillRef idx="1">
+              <a:schemeClr val="accent1"/>
+            </a:fillRef>
+            <a:effectRef idx="0">
+              <a:schemeClr val="accent1"/>
+            </a:effectRef>
+            <a:fontRef idx="minor">
+              <a:schemeClr val="lt1"/>
+            </a:fontRef>
+          </p:style>
+          <p:txBody>
+            <a:bodyPr rtlCol="0" anchor="ctr" anchorCtr="0"/>
+            <a:lstStyle/>
+            <a:p>
+              <a:r>
+                <a:rPr lang="en-US" sz="3600" dirty="0">
+                  <a:solidFill>
+                    <a:schemeClr val="tx1"/>
+                  </a:solidFill>
+                  <a:latin typeface="Times New Roman" panose="02020603050405020304" pitchFamily="18" charset="0"/>
+                  <a:cs typeface="Times New Roman" panose="02020603050405020304" pitchFamily="18" charset="0"/>
+                </a:rPr>
+                <a:t>[1] </a:t>
+              </a:r>
+              <a:r>
+                <a:rPr lang="en-US" sz="3600" dirty="0" err="1">
+                  <a:solidFill>
+                    <a:schemeClr val="tx1"/>
+                  </a:solidFill>
+                  <a:latin typeface="Times New Roman" panose="02020603050405020304" pitchFamily="18" charset="0"/>
+                  <a:cs typeface="Times New Roman" panose="02020603050405020304" pitchFamily="18" charset="0"/>
+                </a:rPr>
+                <a:t>Mnih</a:t>
+              </a:r>
+              <a:r>
+                <a:rPr lang="en-US" sz="3600" dirty="0">
+                  <a:solidFill>
+                    <a:schemeClr val="tx1"/>
+                  </a:solidFill>
+                  <a:latin typeface="Times New Roman" panose="02020603050405020304" pitchFamily="18" charset="0"/>
+                  <a:cs typeface="Times New Roman" panose="02020603050405020304" pitchFamily="18" charset="0"/>
+                </a:rPr>
+                <a:t>, V., </a:t>
+              </a:r>
+              <a:r>
+                <a:rPr lang="en-US" sz="3600" dirty="0" err="1">
+                  <a:solidFill>
+                    <a:schemeClr val="tx1"/>
+                  </a:solidFill>
+                  <a:latin typeface="Times New Roman" panose="02020603050405020304" pitchFamily="18" charset="0"/>
+                  <a:cs typeface="Times New Roman" panose="02020603050405020304" pitchFamily="18" charset="0"/>
+                </a:rPr>
+                <a:t>Kavukcuoglu</a:t>
+              </a:r>
+              <a:r>
+                <a:rPr lang="en-US" sz="3600" dirty="0">
+                  <a:solidFill>
+                    <a:schemeClr val="tx1"/>
+                  </a:solidFill>
+                  <a:latin typeface="Times New Roman" panose="02020603050405020304" pitchFamily="18" charset="0"/>
+                  <a:cs typeface="Times New Roman" panose="02020603050405020304" pitchFamily="18" charset="0"/>
+                </a:rPr>
+                <a:t>, K., Silver, D., </a:t>
+              </a:r>
+              <a:r>
+                <a:rPr lang="en-US" sz="3600" dirty="0" err="1">
+                  <a:solidFill>
+                    <a:schemeClr val="tx1"/>
+                  </a:solidFill>
+                  <a:latin typeface="Times New Roman" panose="02020603050405020304" pitchFamily="18" charset="0"/>
+                  <a:cs typeface="Times New Roman" panose="02020603050405020304" pitchFamily="18" charset="0"/>
+                </a:rPr>
+                <a:t>Rusu</a:t>
+              </a:r>
+              <a:r>
+                <a:rPr lang="en-US" sz="3600" dirty="0">
+                  <a:solidFill>
+                    <a:schemeClr val="tx1"/>
+                  </a:solidFill>
+                  <a:latin typeface="Times New Roman" panose="02020603050405020304" pitchFamily="18" charset="0"/>
+                  <a:cs typeface="Times New Roman" panose="02020603050405020304" pitchFamily="18" charset="0"/>
+                </a:rPr>
+                <a:t>, A. A., </a:t>
+              </a:r>
+              <a:r>
+                <a:rPr lang="en-US" sz="3600" dirty="0" err="1">
+                  <a:solidFill>
+                    <a:schemeClr val="tx1"/>
+                  </a:solidFill>
+                  <a:latin typeface="Times New Roman" panose="02020603050405020304" pitchFamily="18" charset="0"/>
+                  <a:cs typeface="Times New Roman" panose="02020603050405020304" pitchFamily="18" charset="0"/>
+                </a:rPr>
+                <a:t>Veness</a:t>
+              </a:r>
+              <a:r>
+                <a:rPr lang="en-US" sz="3600" dirty="0">
+                  <a:solidFill>
+                    <a:schemeClr val="tx1"/>
+                  </a:solidFill>
+                  <a:latin typeface="Times New Roman" panose="02020603050405020304" pitchFamily="18" charset="0"/>
+                  <a:cs typeface="Times New Roman" panose="02020603050405020304" pitchFamily="18" charset="0"/>
+                </a:rPr>
+                <a:t>, J., </a:t>
+              </a:r>
+              <a:r>
+                <a:rPr lang="en-US" sz="3600" dirty="0" err="1">
+                  <a:solidFill>
+                    <a:schemeClr val="tx1"/>
+                  </a:solidFill>
+                  <a:latin typeface="Times New Roman" panose="02020603050405020304" pitchFamily="18" charset="0"/>
+                  <a:cs typeface="Times New Roman" panose="02020603050405020304" pitchFamily="18" charset="0"/>
+                </a:rPr>
+                <a:t>Bellemare</a:t>
+              </a:r>
+              <a:r>
+                <a:rPr lang="en-US" sz="3600" dirty="0">
+                  <a:solidFill>
+                    <a:schemeClr val="tx1"/>
+                  </a:solidFill>
+                  <a:latin typeface="Times New Roman" panose="02020603050405020304" pitchFamily="18" charset="0"/>
+                  <a:cs typeface="Times New Roman" panose="02020603050405020304" pitchFamily="18" charset="0"/>
+                </a:rPr>
+                <a:t>, M. G., ... &amp; Petersen, S. (2015). Human-level control through deep reinforcement learning. Nature, 518(7540), 529.</a:t>
+              </a:r>
+            </a:p>
+            <a:p>
+              <a:r>
+                <a:rPr lang="en-US" sz="3600" dirty="0">
+                  <a:solidFill>
+                    <a:schemeClr val="tx1"/>
+                  </a:solidFill>
+                  <a:latin typeface="Times New Roman" panose="02020603050405020304" pitchFamily="18" charset="0"/>
+                  <a:cs typeface="Times New Roman" panose="02020603050405020304" pitchFamily="18" charset="0"/>
+                </a:rPr>
+                <a:t>[2] Konda, V. R., &amp; </a:t>
+              </a:r>
+              <a:r>
+                <a:rPr lang="en-US" sz="3600" dirty="0" err="1">
+                  <a:solidFill>
+                    <a:schemeClr val="tx1"/>
+                  </a:solidFill>
+                  <a:latin typeface="Times New Roman" panose="02020603050405020304" pitchFamily="18" charset="0"/>
+                  <a:cs typeface="Times New Roman" panose="02020603050405020304" pitchFamily="18" charset="0"/>
+                </a:rPr>
+                <a:t>Tsitsiklis</a:t>
+              </a:r>
+              <a:r>
+                <a:rPr lang="en-US" sz="3600" dirty="0">
+                  <a:solidFill>
+                    <a:schemeClr val="tx1"/>
+                  </a:solidFill>
+                  <a:latin typeface="Times New Roman" panose="02020603050405020304" pitchFamily="18" charset="0"/>
+                  <a:cs typeface="Times New Roman" panose="02020603050405020304" pitchFamily="18" charset="0"/>
+                </a:rPr>
+                <a:t>, J. N. (2000). Actor-critic algorithms. In Advances in neural information processing systems (pp. 1008-1014.</a:t>
+              </a:r>
+            </a:p>
+            <a:p>
+              <a:r>
+                <a:rPr lang="en-US" sz="3600" dirty="0">
+                  <a:solidFill>
+                    <a:schemeClr val="tx1"/>
+                  </a:solidFill>
+                  <a:latin typeface="Times New Roman" panose="02020603050405020304" pitchFamily="18" charset="0"/>
+                  <a:cs typeface="Times New Roman" panose="02020603050405020304" pitchFamily="18" charset="0"/>
+                </a:rPr>
+                <a:t>[3] Jonker, R., &amp; </a:t>
+              </a:r>
+              <a:r>
+                <a:rPr lang="en-US" sz="3600" dirty="0" err="1">
+                  <a:solidFill>
+                    <a:schemeClr val="tx1"/>
+                  </a:solidFill>
+                  <a:latin typeface="Times New Roman" panose="02020603050405020304" pitchFamily="18" charset="0"/>
+                  <a:cs typeface="Times New Roman" panose="02020603050405020304" pitchFamily="18" charset="0"/>
+                </a:rPr>
+                <a:t>Volgenant</a:t>
+              </a:r>
+              <a:r>
+                <a:rPr lang="en-US" sz="3600" dirty="0">
+                  <a:solidFill>
+                    <a:schemeClr val="tx1"/>
+                  </a:solidFill>
+                  <a:latin typeface="Times New Roman" panose="02020603050405020304" pitchFamily="18" charset="0"/>
+                  <a:cs typeface="Times New Roman" panose="02020603050405020304" pitchFamily="18" charset="0"/>
+                </a:rPr>
+                <a:t>, T. (1986). Improving the Hungarian assignment algorithm. Operations Research Letters, 5(4), 171-175.</a:t>
+              </a:r>
+            </a:p>
+          </p:txBody>
+        </p:sp>
+      </p:grpSp>
     </p:spTree>
     <p:extLst>
       <p:ext uri="{BB962C8B-B14F-4D97-AF65-F5344CB8AC3E}">
@@ -3364,4 +5702,299 @@
     </a:ext>
   </a:extLst>
 </a:theme>
+</file>
+
+<file path=ppt/theme/theme2.xml><?xml version="1.0" encoding="utf-8"?>
+<a:theme xmlns:a="http://schemas.openxmlformats.org/drawingml/2006/main" name="Office Theme">
+  <a:themeElements>
+    <a:clrScheme name="Office">
+      <a:dk1>
+        <a:sysClr val="windowText" lastClr="000000"/>
+      </a:dk1>
+      <a:lt1>
+        <a:sysClr val="window" lastClr="FFFFFF"/>
+      </a:lt1>
+      <a:dk2>
+        <a:srgbClr val="44546A"/>
+      </a:dk2>
+      <a:lt2>
+        <a:srgbClr val="E7E6E6"/>
+      </a:lt2>
+      <a:accent1>
+        <a:srgbClr val="4472C4"/>
+      </a:accent1>
+      <a:accent2>
+        <a:srgbClr val="ED7D31"/>
+      </a:accent2>
+      <a:accent3>
+        <a:srgbClr val="A5A5A5"/>
+      </a:accent3>
+      <a:accent4>
+        <a:srgbClr val="FFC000"/>
+      </a:accent4>
+      <a:accent5>
+        <a:srgbClr val="5B9BD5"/>
+      </a:accent5>
+      <a:accent6>
+        <a:srgbClr val="70AD47"/>
+      </a:accent6>
+      <a:hlink>
+        <a:srgbClr val="0563C1"/>
+      </a:hlink>
+      <a:folHlink>
+        <a:srgbClr val="954F72"/>
+      </a:folHlink>
+    </a:clrScheme>
+    <a:fontScheme name="Office">
+      <a:majorFont>
+        <a:latin typeface="Calibri Light" panose="020F0302020204030204"/>
+        <a:ea typeface=""/>
+        <a:cs typeface=""/>
+        <a:font script="Jpan" typeface="游ゴシック Light"/>
+        <a:font script="Hang" typeface="맑은 고딕"/>
+        <a:font script="Hans" typeface="等线 Light"/>
+        <a:font script="Hant" typeface="新細明體"/>
+        <a:font script="Arab" typeface="Times New Roman"/>
+        <a:font script="Hebr" typeface="Times New Roman"/>
+        <a:font script="Thai" typeface="Angsana New"/>
+        <a:font script="Ethi" typeface="Nyala"/>
+        <a:font script="Beng" typeface="Vrinda"/>
+        <a:font script="Gujr" typeface="Shruti"/>
+        <a:font script="Khmr" typeface="MoolBoran"/>
+        <a:font script="Knda" typeface="Tunga"/>
+        <a:font script="Guru" typeface="Raavi"/>
+        <a:font script="Cans" typeface="Euphemia"/>
+        <a:font script="Cher" typeface="Plantagenet Cherokee"/>
+        <a:font script="Yiii" typeface="Microsoft Yi Baiti"/>
+        <a:font script="Tibt" typeface="Microsoft Himalaya"/>
+        <a:font script="Thaa" typeface="MV Boli"/>
+        <a:font script="Deva" typeface="Mangal"/>
+        <a:font script="Telu" typeface="Gautami"/>
+        <a:font script="Taml" typeface="Latha"/>
+        <a:font script="Syrc" typeface="Estrangelo Edessa"/>
+        <a:font script="Orya" typeface="Kalinga"/>
+        <a:font script="Mlym" typeface="Kartika"/>
+        <a:font script="Laoo" typeface="DokChampa"/>
+        <a:font script="Sinh" typeface="Iskoola Pota"/>
+        <a:font script="Mong" typeface="Mongolian Baiti"/>
+        <a:font script="Viet" typeface="Times New Roman"/>
+        <a:font script="Uigh" typeface="Microsoft Uighur"/>
+        <a:font script="Geor" typeface="Sylfaen"/>
+        <a:font script="Armn" typeface="Arial"/>
+        <a:font script="Bugi" typeface="Leelawadee UI"/>
+        <a:font script="Bopo" typeface="Microsoft JhengHei"/>
+        <a:font script="Java" typeface="Javanese Text"/>
+        <a:font script="Lisu" typeface="Segoe UI"/>
+        <a:font script="Mymr" typeface="Myanmar Text"/>
+        <a:font script="Nkoo" typeface="Ebrima"/>
+        <a:font script="Olck" typeface="Nirmala UI"/>
+        <a:font script="Osma" typeface="Ebrima"/>
+        <a:font script="Phag" typeface="Phagspa"/>
+        <a:font script="Syrn" typeface="Estrangelo Edessa"/>
+        <a:font script="Syrj" typeface="Estrangelo Edessa"/>
+        <a:font script="Syre" typeface="Estrangelo Edessa"/>
+        <a:font script="Sora" typeface="Nirmala UI"/>
+        <a:font script="Tale" typeface="Microsoft Tai Le"/>
+        <a:font script="Talu" typeface="Microsoft New Tai Lue"/>
+        <a:font script="Tfng" typeface="Ebrima"/>
+      </a:majorFont>
+      <a:minorFont>
+        <a:latin typeface="Calibri" panose="020F0502020204030204"/>
+        <a:ea typeface=""/>
+        <a:cs typeface=""/>
+        <a:font script="Jpan" typeface="游ゴシック"/>
+        <a:font script="Hang" typeface="맑은 고딕"/>
+        <a:font script="Hans" typeface="等线"/>
+        <a:font script="Hant" typeface="新細明體"/>
+        <a:font script="Arab" typeface="Arial"/>
+        <a:font script="Hebr" typeface="Arial"/>
+        <a:font script="Thai" typeface="Cordia New"/>
+        <a:font script="Ethi" typeface="Nyala"/>
+        <a:font script="Beng" typeface="Vrinda"/>
+        <a:font script="Gujr" typeface="Shruti"/>
+        <a:font script="Khmr" typeface="DaunPenh"/>
+        <a:font script="Knda" typeface="Tunga"/>
+        <a:font script="Guru" typeface="Raavi"/>
+        <a:font script="Cans" typeface="Euphemia"/>
+        <a:font script="Cher" typeface="Plantagenet Cherokee"/>
+        <a:font script="Yiii" typeface="Microsoft Yi Baiti"/>
+        <a:font script="Tibt" typeface="Microsoft Himalaya"/>
+        <a:font script="Thaa" typeface="MV Boli"/>
+        <a:font script="Deva" typeface="Mangal"/>
+        <a:font script="Telu" typeface="Gautami"/>
+        <a:font script="Taml" typeface="Latha"/>
+        <a:font script="Syrc" typeface="Estrangelo Edessa"/>
+        <a:font script="Orya" typeface="Kalinga"/>
+        <a:font script="Mlym" typeface="Kartika"/>
+        <a:font script="Laoo" typeface="DokChampa"/>
+        <a:font script="Sinh" typeface="Iskoola Pota"/>
+        <a:font script="Mong" typeface="Mongolian Baiti"/>
+        <a:font script="Viet" typeface="Arial"/>
+        <a:font script="Uigh" typeface="Microsoft Uighur"/>
+        <a:font script="Geor" typeface="Sylfaen"/>
+        <a:font script="Armn" typeface="Arial"/>
+        <a:font script="Bugi" typeface="Leelawadee UI"/>
+        <a:font script="Bopo" typeface="Microsoft JhengHei"/>
+        <a:font script="Java" typeface="Javanese Text"/>
+        <a:font script="Lisu" typeface="Segoe UI"/>
+        <a:font script="Mymr" typeface="Myanmar Text"/>
+        <a:font script="Nkoo" typeface="Ebrima"/>
+        <a:font script="Olck" typeface="Nirmala UI"/>
+        <a:font script="Osma" typeface="Ebrima"/>
+        <a:font script="Phag" typeface="Phagspa"/>
+        <a:font script="Syrn" typeface="Estrangelo Edessa"/>
+        <a:font script="Syrj" typeface="Estrangelo Edessa"/>
+        <a:font script="Syre" typeface="Estrangelo Edessa"/>
+        <a:font script="Sora" typeface="Nirmala UI"/>
+        <a:font script="Tale" typeface="Microsoft Tai Le"/>
+        <a:font script="Talu" typeface="Microsoft New Tai Lue"/>
+        <a:font script="Tfng" typeface="Ebrima"/>
+      </a:minorFont>
+    </a:fontScheme>
+    <a:fmtScheme name="Office">
+      <a:fillStyleLst>
+        <a:solidFill>
+          <a:schemeClr val="phClr"/>
+        </a:solidFill>
+        <a:gradFill rotWithShape="1">
+          <a:gsLst>
+            <a:gs pos="0">
+              <a:schemeClr val="phClr">
+                <a:lumMod val="110000"/>
+                <a:satMod val="105000"/>
+                <a:tint val="67000"/>
+              </a:schemeClr>
+            </a:gs>
+            <a:gs pos="50000">
+              <a:schemeClr val="phClr">
+                <a:lumMod val="105000"/>
+                <a:satMod val="103000"/>
+                <a:tint val="73000"/>
+              </a:schemeClr>
+            </a:gs>
+            <a:gs pos="100000">
+              <a:schemeClr val="phClr">
+                <a:lumMod val="105000"/>
+                <a:satMod val="109000"/>
+                <a:tint val="81000"/>
+              </a:schemeClr>
+            </a:gs>
+          </a:gsLst>
+          <a:lin ang="5400000" scaled="0"/>
+        </a:gradFill>
+        <a:gradFill rotWithShape="1">
+          <a:gsLst>
+            <a:gs pos="0">
+              <a:schemeClr val="phClr">
+                <a:satMod val="103000"/>
+                <a:lumMod val="102000"/>
+                <a:tint val="94000"/>
+              </a:schemeClr>
+            </a:gs>
+            <a:gs pos="50000">
+              <a:schemeClr val="phClr">
+                <a:satMod val="110000"/>
+                <a:lumMod val="100000"/>
+                <a:shade val="100000"/>
+              </a:schemeClr>
+            </a:gs>
+            <a:gs pos="100000">
+              <a:schemeClr val="phClr">
+                <a:lumMod val="99000"/>
+                <a:satMod val="120000"/>
+                <a:shade val="78000"/>
+              </a:schemeClr>
+            </a:gs>
+          </a:gsLst>
+          <a:lin ang="5400000" scaled="0"/>
+        </a:gradFill>
+      </a:fillStyleLst>
+      <a:lnStyleLst>
+        <a:ln w="6350" cap="flat" cmpd="sng" algn="ctr">
+          <a:solidFill>
+            <a:schemeClr val="phClr"/>
+          </a:solidFill>
+          <a:prstDash val="solid"/>
+          <a:miter lim="800000"/>
+        </a:ln>
+        <a:ln w="12700" cap="flat" cmpd="sng" algn="ctr">
+          <a:solidFill>
+            <a:schemeClr val="phClr"/>
+          </a:solidFill>
+          <a:prstDash val="solid"/>
+          <a:miter lim="800000"/>
+        </a:ln>
+        <a:ln w="19050" cap="flat" cmpd="sng" algn="ctr">
+          <a:solidFill>
+            <a:schemeClr val="phClr"/>
+          </a:solidFill>
+          <a:prstDash val="solid"/>
+          <a:miter lim="800000"/>
+        </a:ln>
+      </a:lnStyleLst>
+      <a:effectStyleLst>
+        <a:effectStyle>
+          <a:effectLst/>
+        </a:effectStyle>
+        <a:effectStyle>
+          <a:effectLst/>
+        </a:effectStyle>
+        <a:effectStyle>
+          <a:effectLst>
+            <a:outerShdw blurRad="57150" dist="19050" dir="5400000" algn="ctr" rotWithShape="0">
+              <a:srgbClr val="000000">
+                <a:alpha val="63000"/>
+              </a:srgbClr>
+            </a:outerShdw>
+          </a:effectLst>
+        </a:effectStyle>
+      </a:effectStyleLst>
+      <a:bgFillStyleLst>
+        <a:solidFill>
+          <a:schemeClr val="phClr"/>
+        </a:solidFill>
+        <a:solidFill>
+          <a:schemeClr val="phClr">
+            <a:tint val="95000"/>
+            <a:satMod val="170000"/>
+          </a:schemeClr>
+        </a:solidFill>
+        <a:gradFill rotWithShape="1">
+          <a:gsLst>
+            <a:gs pos="0">
+              <a:schemeClr val="phClr">
+                <a:tint val="93000"/>
+                <a:satMod val="150000"/>
+                <a:shade val="98000"/>
+                <a:lumMod val="102000"/>
+              </a:schemeClr>
+            </a:gs>
+            <a:gs pos="50000">
+              <a:schemeClr val="phClr">
+                <a:tint val="98000"/>
+                <a:satMod val="130000"/>
+                <a:shade val="90000"/>
+                <a:lumMod val="103000"/>
+              </a:schemeClr>
+            </a:gs>
+            <a:gs pos="100000">
+              <a:schemeClr val="phClr">
+                <a:shade val="63000"/>
+                <a:satMod val="120000"/>
+              </a:schemeClr>
+            </a:gs>
+          </a:gsLst>
+          <a:lin ang="5400000" scaled="0"/>
+        </a:gradFill>
+      </a:bgFillStyleLst>
+    </a:fmtScheme>
+  </a:themeElements>
+  <a:objectDefaults/>
+  <a:extraClrSchemeLst/>
+  <a:extLst>
+    <a:ext uri="{05A4C25C-085E-4340-85A3-A5531E510DB2}">
+      <thm15:themeFamily xmlns:thm15="http://schemas.microsoft.com/office/thememl/2012/main" name="Office Theme" id="{62F939B6-93AF-4DB8-9C6B-D6C7DFDC589F}" vid="{4A3C46E8-61CC-4603-A589-7422A47A8E4A}"/>
+    </a:ext>
+  </a:extLst>
+</a:theme>
 </file>
</xml_diff>

<commit_message>
Updated simulator and global greedy; Updated Poster
</commit_message>
<xml_diff>
--- a/poster.pptx
+++ b/poster.pptx
@@ -164,7 +164,7 @@
             </a:lvl1pPr>
           </a:lstStyle>
           <a:p>
-            <a:endParaRPr lang="en-US"/>
+            <a:endParaRPr lang="en-US" dirty="0"/>
           </a:p>
         </p:txBody>
       </p:sp>
@@ -197,9 +197,9 @@
           <a:p>
             <a:fld id="{1B3AA9AF-0677-5F4B-BB55-8180843B69E8}" type="datetimeFigureOut">
               <a:rPr lang="en-US" smtClean="0"/>
-              <a:t>4/22/19</a:t>
+              <a:t>4/25/19</a:t>
             </a:fld>
-            <a:endParaRPr lang="en-US"/>
+            <a:endParaRPr lang="en-US" dirty="0"/>
           </a:p>
         </p:txBody>
       </p:sp>
@@ -232,7 +232,7 @@
           <a:bodyPr vert="horz" lIns="91440" tIns="45720" rIns="91440" bIns="45720" rtlCol="0" anchor="ctr"/>
           <a:lstStyle/>
           <a:p>
-            <a:endParaRPr lang="en-US"/>
+            <a:endParaRPr lang="en-US" dirty="0"/>
           </a:p>
         </p:txBody>
       </p:sp>
@@ -322,7 +322,7 @@
             </a:lvl1pPr>
           </a:lstStyle>
           <a:p>
-            <a:endParaRPr lang="en-US"/>
+            <a:endParaRPr lang="en-US" dirty="0"/>
           </a:p>
         </p:txBody>
       </p:sp>
@@ -357,7 +357,7 @@
               <a:rPr lang="en-US" smtClean="0"/>
               <a:t>‹#›</a:t>
             </a:fld>
-            <a:endParaRPr lang="en-US"/>
+            <a:endParaRPr lang="en-US" dirty="0"/>
           </a:p>
         </p:txBody>
       </p:sp>
@@ -531,7 +531,7 @@
               <a:rPr lang="en-US" smtClean="0"/>
               <a:t>1</a:t>
             </a:fld>
-            <a:endParaRPr lang="en-US"/>
+            <a:endParaRPr lang="en-US" dirty="0"/>
           </a:p>
         </p:txBody>
       </p:sp>
@@ -679,7 +679,7 @@
           <a:p>
             <a:fld id="{773F4608-2C34-4546-97E8-AB075EF485EC}" type="datetimeFigureOut">
               <a:rPr lang="en-US" smtClean="0"/>
-              <a:t>4/22/19</a:t>
+              <a:t>4/25/19</a:t>
             </a:fld>
             <a:endParaRPr lang="en-US" dirty="0"/>
           </a:p>
@@ -849,7 +849,7 @@
           <a:p>
             <a:fld id="{773F4608-2C34-4546-97E8-AB075EF485EC}" type="datetimeFigureOut">
               <a:rPr lang="en-US" smtClean="0"/>
-              <a:t>4/22/19</a:t>
+              <a:t>4/25/19</a:t>
             </a:fld>
             <a:endParaRPr lang="en-US" dirty="0"/>
           </a:p>
@@ -1029,7 +1029,7 @@
           <a:p>
             <a:fld id="{773F4608-2C34-4546-97E8-AB075EF485EC}" type="datetimeFigureOut">
               <a:rPr lang="en-US" smtClean="0"/>
-              <a:t>4/22/19</a:t>
+              <a:t>4/25/19</a:t>
             </a:fld>
             <a:endParaRPr lang="en-US" dirty="0"/>
           </a:p>
@@ -1199,7 +1199,7 @@
           <a:p>
             <a:fld id="{773F4608-2C34-4546-97E8-AB075EF485EC}" type="datetimeFigureOut">
               <a:rPr lang="en-US" smtClean="0"/>
-              <a:t>4/22/19</a:t>
+              <a:t>4/25/19</a:t>
             </a:fld>
             <a:endParaRPr lang="en-US" dirty="0"/>
           </a:p>
@@ -1443,7 +1443,7 @@
           <a:p>
             <a:fld id="{773F4608-2C34-4546-97E8-AB075EF485EC}" type="datetimeFigureOut">
               <a:rPr lang="en-US" smtClean="0"/>
-              <a:t>4/22/19</a:t>
+              <a:t>4/25/19</a:t>
             </a:fld>
             <a:endParaRPr lang="en-US" dirty="0"/>
           </a:p>
@@ -1675,7 +1675,7 @@
           <a:p>
             <a:fld id="{773F4608-2C34-4546-97E8-AB075EF485EC}" type="datetimeFigureOut">
               <a:rPr lang="en-US" smtClean="0"/>
-              <a:t>4/22/19</a:t>
+              <a:t>4/25/19</a:t>
             </a:fld>
             <a:endParaRPr lang="en-US" dirty="0"/>
           </a:p>
@@ -2042,7 +2042,7 @@
           <a:p>
             <a:fld id="{773F4608-2C34-4546-97E8-AB075EF485EC}" type="datetimeFigureOut">
               <a:rPr lang="en-US" smtClean="0"/>
-              <a:t>4/22/19</a:t>
+              <a:t>4/25/19</a:t>
             </a:fld>
             <a:endParaRPr lang="en-US" dirty="0"/>
           </a:p>
@@ -2160,7 +2160,7 @@
           <a:p>
             <a:fld id="{773F4608-2C34-4546-97E8-AB075EF485EC}" type="datetimeFigureOut">
               <a:rPr lang="en-US" smtClean="0"/>
-              <a:t>4/22/19</a:t>
+              <a:t>4/25/19</a:t>
             </a:fld>
             <a:endParaRPr lang="en-US" dirty="0"/>
           </a:p>
@@ -2255,7 +2255,7 @@
           <a:p>
             <a:fld id="{773F4608-2C34-4546-97E8-AB075EF485EC}" type="datetimeFigureOut">
               <a:rPr lang="en-US" smtClean="0"/>
-              <a:t>4/22/19</a:t>
+              <a:t>4/25/19</a:t>
             </a:fld>
             <a:endParaRPr lang="en-US" dirty="0"/>
           </a:p>
@@ -2532,7 +2532,7 @@
           <a:p>
             <a:fld id="{773F4608-2C34-4546-97E8-AB075EF485EC}" type="datetimeFigureOut">
               <a:rPr lang="en-US" smtClean="0"/>
-              <a:t>4/22/19</a:t>
+              <a:t>4/25/19</a:t>
             </a:fld>
             <a:endParaRPr lang="en-US" dirty="0"/>
           </a:p>
@@ -2788,7 +2788,7 @@
           <a:p>
             <a:fld id="{773F4608-2C34-4546-97E8-AB075EF485EC}" type="datetimeFigureOut">
               <a:rPr lang="en-US" smtClean="0"/>
-              <a:t>4/22/19</a:t>
+              <a:t>4/25/19</a:t>
             </a:fld>
             <a:endParaRPr lang="en-US" dirty="0"/>
           </a:p>
@@ -3001,7 +3001,7 @@
           <a:p>
             <a:fld id="{773F4608-2C34-4546-97E8-AB075EF485EC}" type="datetimeFigureOut">
               <a:rPr lang="en-US" smtClean="0"/>
-              <a:t>4/22/19</a:t>
+              <a:t>4/25/19</a:t>
             </a:fld>
             <a:endParaRPr lang="en-US" dirty="0"/>
           </a:p>
@@ -3533,82 +3533,6 @@
           </a:prstGeom>
         </p:spPr>
       </p:pic>
-      <p:cxnSp>
-        <p:nvCxnSpPr>
-          <p:cNvPr id="4" name="Straight Connector 3">
-            <a:extLst>
-              <a:ext uri="{FF2B5EF4-FFF2-40B4-BE49-F238E27FC236}">
-                <a16:creationId xmlns:a16="http://schemas.microsoft.com/office/drawing/2014/main" id="{C8FD0724-811C-B540-A7BD-0738D727AAD9}"/>
-              </a:ext>
-            </a:extLst>
-          </p:cNvPr>
-          <p:cNvCxnSpPr>
-            <a:cxnSpLocks/>
-          </p:cNvCxnSpPr>
-          <p:nvPr/>
-        </p:nvCxnSpPr>
-        <p:spPr>
-          <a:xfrm>
-            <a:off x="11826821" y="3945321"/>
-            <a:ext cx="0" cy="22793190"/>
-          </a:xfrm>
-          <a:prstGeom prst="line">
-            <a:avLst/>
-          </a:prstGeom>
-        </p:spPr>
-        <p:style>
-          <a:lnRef idx="1">
-            <a:schemeClr val="accent1"/>
-          </a:lnRef>
-          <a:fillRef idx="0">
-            <a:schemeClr val="accent1"/>
-          </a:fillRef>
-          <a:effectRef idx="0">
-            <a:schemeClr val="accent1"/>
-          </a:effectRef>
-          <a:fontRef idx="minor">
-            <a:schemeClr val="tx1"/>
-          </a:fontRef>
-        </p:style>
-      </p:cxnSp>
-      <p:cxnSp>
-        <p:nvCxnSpPr>
-          <p:cNvPr id="7" name="Straight Connector 6">
-            <a:extLst>
-              <a:ext uri="{FF2B5EF4-FFF2-40B4-BE49-F238E27FC236}">
-                <a16:creationId xmlns:a16="http://schemas.microsoft.com/office/drawing/2014/main" id="{8A84D6C9-E667-C74E-92E3-39FB35772DE5}"/>
-              </a:ext>
-            </a:extLst>
-          </p:cNvPr>
-          <p:cNvCxnSpPr>
-            <a:cxnSpLocks/>
-          </p:cNvCxnSpPr>
-          <p:nvPr/>
-        </p:nvCxnSpPr>
-        <p:spPr>
-          <a:xfrm>
-            <a:off x="24755421" y="3945321"/>
-            <a:ext cx="0" cy="22793190"/>
-          </a:xfrm>
-          <a:prstGeom prst="line">
-            <a:avLst/>
-          </a:prstGeom>
-        </p:spPr>
-        <p:style>
-          <a:lnRef idx="1">
-            <a:schemeClr val="accent1"/>
-          </a:lnRef>
-          <a:fillRef idx="0">
-            <a:schemeClr val="accent1"/>
-          </a:fillRef>
-          <a:effectRef idx="0">
-            <a:schemeClr val="accent1"/>
-          </a:effectRef>
-          <a:fontRef idx="minor">
-            <a:schemeClr val="tx1"/>
-          </a:fontRef>
-        </p:style>
-      </p:cxnSp>
       <p:grpSp>
         <p:nvGrpSpPr>
           <p:cNvPr id="19" name="Group 18">
@@ -3623,10 +3547,10 @@
         </p:nvGrpSpPr>
         <p:grpSpPr>
           <a:xfrm>
-            <a:off x="563232" y="4278650"/>
-            <a:ext cx="10946274" cy="7216663"/>
+            <a:off x="419451" y="4278650"/>
+            <a:ext cx="12849484" cy="6627781"/>
             <a:chOff x="563232" y="4278651"/>
-            <a:chExt cx="10946274" cy="6438827"/>
+            <a:chExt cx="10946274" cy="5913417"/>
           </a:xfrm>
         </p:grpSpPr>
         <p:sp>
@@ -3701,7 +3625,7 @@
           <p:spPr>
             <a:xfrm>
               <a:off x="563232" y="5452532"/>
-              <a:ext cx="10946274" cy="5264946"/>
+              <a:ext cx="10946274" cy="4739536"/>
             </a:xfrm>
             <a:prstGeom prst="rect">
               <a:avLst/>
@@ -3736,47 +3660,7 @@
                   <a:latin typeface="Times New Roman" panose="02020603050405020304" pitchFamily="18" charset="0"/>
                   <a:cs typeface="Times New Roman" panose="02020603050405020304" pitchFamily="18" charset="0"/>
                 </a:rPr>
-                <a:t>With higher speed and less time spent in parking, autonomous mobility-on-demand (</a:t>
-              </a:r>
-              <a:r>
-                <a:rPr lang="en-US" sz="3600" dirty="0" err="1">
-                  <a:solidFill>
-                    <a:schemeClr val="tx1"/>
-                  </a:solidFill>
-                  <a:latin typeface="Times New Roman" panose="02020603050405020304" pitchFamily="18" charset="0"/>
-                  <a:cs typeface="Times New Roman" panose="02020603050405020304" pitchFamily="18" charset="0"/>
-                </a:rPr>
-                <a:t>AMoD</a:t>
-              </a:r>
-              <a:r>
-                <a:rPr lang="en-US" sz="3600" dirty="0">
-                  <a:solidFill>
-                    <a:schemeClr val="tx1"/>
-                  </a:solidFill>
-                  <a:latin typeface="Times New Roman" panose="02020603050405020304" pitchFamily="18" charset="0"/>
-                  <a:cs typeface="Times New Roman" panose="02020603050405020304" pitchFamily="18" charset="0"/>
-                </a:rPr>
-                <a:t>) system is predicted to be the solution for the future to reduce the pressure from urban mobility. In this project, we adopts Deep Q-Learning network (DQN) of the previous work and Actor-Critic Network (A2C), and creates new new states and actions, which are more close to the actual situation. The combination of the modified networks and the novel variables make the </a:t>
-              </a:r>
-              <a:r>
-                <a:rPr lang="en-US" sz="3600" dirty="0" err="1">
-                  <a:solidFill>
-                    <a:schemeClr val="tx1"/>
-                  </a:solidFill>
-                  <a:latin typeface="Times New Roman" panose="02020603050405020304" pitchFamily="18" charset="0"/>
-                  <a:cs typeface="Times New Roman" panose="02020603050405020304" pitchFamily="18" charset="0"/>
-                </a:rPr>
-                <a:t>AMoD</a:t>
-              </a:r>
-              <a:r>
-                <a:rPr lang="en-US" sz="3600" dirty="0">
-                  <a:solidFill>
-                    <a:schemeClr val="tx1"/>
-                  </a:solidFill>
-                  <a:latin typeface="Times New Roman" panose="02020603050405020304" pitchFamily="18" charset="0"/>
-                  <a:cs typeface="Times New Roman" panose="02020603050405020304" pitchFamily="18" charset="0"/>
-                </a:rPr>
-                <a:t> system more reliable.</a:t>
+                <a:t>Autonomous mobility-on-demand (AMoD) system is predicted to be the solution for the future to reduce the pressure from urban mobility. In this project, we adopts Deep Q-Learning network (DQN) of the previous work and Actor-Critic Network (A2C), and creates new states and actions, which are closer to the actual situation. The combination of the modified networks and the novel variables make the AMoD system more reliable.</a:t>
               </a:r>
             </a:p>
           </p:txBody>
@@ -3796,10 +3680,10 @@
         </p:nvGrpSpPr>
         <p:grpSpPr>
           <a:xfrm>
-            <a:off x="560108" y="12321785"/>
-            <a:ext cx="10946274" cy="14415006"/>
-            <a:chOff x="563232" y="2664103"/>
-            <a:chExt cx="10946274" cy="14415006"/>
+            <a:off x="419450" y="11180882"/>
+            <a:ext cx="12849484" cy="15555908"/>
+            <a:chOff x="563232" y="2058019"/>
+            <a:chExt cx="10946274" cy="15555908"/>
           </a:xfrm>
         </p:grpSpPr>
         <p:sp>
@@ -3816,7 +3700,7 @@
           </p:nvSpPr>
           <p:spPr>
             <a:xfrm>
-              <a:off x="563232" y="2664103"/>
+              <a:off x="563232" y="2058019"/>
               <a:ext cx="10946274" cy="1173882"/>
             </a:xfrm>
             <a:prstGeom prst="rect">
@@ -3873,8 +3757,8 @@
           </p:nvSpPr>
           <p:spPr>
             <a:xfrm>
-              <a:off x="563232" y="3837985"/>
-              <a:ext cx="10946274" cy="13241124"/>
+              <a:off x="563232" y="3231901"/>
+              <a:ext cx="10946274" cy="14382026"/>
             </a:xfrm>
             <a:prstGeom prst="rect">
               <a:avLst/>
@@ -3901,6 +3785,11 @@
             <a:bodyPr rtlCol="0" anchor="ctr"/>
             <a:lstStyle/>
             <a:p>
+              <a:pPr>
+                <a:lnSpc>
+                  <a:spcPts val="4020"/>
+                </a:lnSpc>
+              </a:pPr>
               <a:r>
                 <a:rPr lang="en-US" sz="3600" b="1" i="1" dirty="0">
                   <a:solidFill>
@@ -3913,6 +3802,11 @@
               </a:r>
             </a:p>
             <a:p>
+              <a:pPr>
+                <a:lnSpc>
+                  <a:spcPts val="4020"/>
+                </a:lnSpc>
+              </a:pPr>
               <a:r>
                 <a:rPr lang="en-US" sz="3600" dirty="0">
                   <a:solidFill>
@@ -3941,7 +3835,7 @@
                   <a:latin typeface="Times New Roman" panose="02020603050405020304" pitchFamily="18" charset="0"/>
                   <a:cs typeface="Times New Roman" panose="02020603050405020304" pitchFamily="18" charset="0"/>
                 </a:rPr>
-                <a:t>), action space(</a:t>
+                <a:t>), action space ( </a:t>
               </a:r>
               <a:r>
                 <a:rPr lang="en-US" sz="3600" i="1" dirty="0">
@@ -3951,7 +3845,7 @@
                   <a:latin typeface="Times New Roman" panose="02020603050405020304" pitchFamily="18" charset="0"/>
                   <a:cs typeface="Times New Roman" panose="02020603050405020304" pitchFamily="18" charset="0"/>
                 </a:rPr>
-                <a:t>A</a:t>
+                <a:t>A = </a:t>
               </a:r>
               <a:r>
                 <a:rPr lang="en-US" sz="3600" dirty="0">
@@ -3961,11 +3855,14 @@
                   <a:latin typeface="Times New Roman" panose="02020603050405020304" pitchFamily="18" charset="0"/>
                   <a:cs typeface="Times New Roman" panose="02020603050405020304" pitchFamily="18" charset="0"/>
                 </a:rPr>
-                <a:t>). The state that goes into the neural network is counting-based, including:</a:t>
+                <a:t>{pickups, rebalance to adjacent regions, stay}). The state that goes into the neural network is counting-based, including:</a:t>
               </a:r>
             </a:p>
             <a:p>
               <a:pPr marL="571500" indent="-571500">
+                <a:lnSpc>
+                  <a:spcPts val="4020"/>
+                </a:lnSpc>
                 <a:buFont typeface="Arial" panose="020B0604020202020204" pitchFamily="34" charset="0"/>
                 <a:buChar char="•"/>
               </a:pPr>
@@ -3982,6 +3879,9 @@
             </a:p>
             <a:p>
               <a:pPr marL="571500" indent="-571500">
+                <a:lnSpc>
+                  <a:spcPts val="4020"/>
+                </a:lnSpc>
                 <a:buFont typeface="Arial" panose="020B0604020202020204" pitchFamily="34" charset="0"/>
                 <a:buChar char="•"/>
               </a:pPr>
@@ -3998,6 +3898,9 @@
             </a:p>
             <a:p>
               <a:pPr marL="571500" indent="-571500">
+                <a:lnSpc>
+                  <a:spcPts val="4020"/>
+                </a:lnSpc>
                 <a:buFont typeface="Arial" panose="020B0604020202020204" pitchFamily="34" charset="0"/>
                 <a:buChar char="•"/>
               </a:pPr>
@@ -4014,6 +3917,9 @@
             </a:p>
             <a:p>
               <a:pPr marL="571500" indent="-571500">
+                <a:lnSpc>
+                  <a:spcPts val="4020"/>
+                </a:lnSpc>
                 <a:buFont typeface="Arial" panose="020B0604020202020204" pitchFamily="34" charset="0"/>
                 <a:buChar char="•"/>
               </a:pPr>
@@ -4026,6 +3932,11 @@
               </a:endParaRPr>
             </a:p>
             <a:p>
+              <a:pPr>
+                <a:lnSpc>
+                  <a:spcPts val="4020"/>
+                </a:lnSpc>
+              </a:pPr>
               <a:r>
                 <a:rPr lang="en-US" sz="3600" b="1" i="1" dirty="0">
                   <a:solidFill>
@@ -4038,19 +3949,38 @@
               </a:r>
             </a:p>
             <a:p>
-              <a:r>
-                <a:rPr lang="en-US" sz="3600" dirty="0">
-                  <a:solidFill>
-                    <a:schemeClr val="tx1"/>
-                  </a:solidFill>
-                  <a:latin typeface="Times New Roman" panose="02020603050405020304" pitchFamily="18" charset="0"/>
-                  <a:cs typeface="Times New Roman" panose="02020603050405020304" pitchFamily="18" charset="0"/>
-                </a:rPr>
-                <a:t>Reward = Pick Up Award - Distance Cost - No Pickup Penalty</a:t>
-              </a:r>
+              <a:pPr>
+                <a:lnSpc>
+                  <a:spcPts val="4020"/>
+                </a:lnSpc>
+              </a:pPr>
+              <a:endParaRPr lang="en-US" sz="3600" b="1" i="1" dirty="0">
+                <a:solidFill>
+                  <a:schemeClr val="tx1"/>
+                </a:solidFill>
+                <a:latin typeface="Times New Roman" panose="02020603050405020304" pitchFamily="18" charset="0"/>
+                <a:cs typeface="Times New Roman" panose="02020603050405020304" pitchFamily="18" charset="0"/>
+              </a:endParaRPr>
+            </a:p>
+            <a:p>
+              <a:pPr>
+                <a:lnSpc>
+                  <a:spcPts val="4020"/>
+                </a:lnSpc>
+              </a:pPr>
+              <a:endParaRPr lang="en-US" sz="3600" dirty="0">
+                <a:solidFill>
+                  <a:schemeClr val="tx1"/>
+                </a:solidFill>
+                <a:latin typeface="Times New Roman" panose="02020603050405020304" pitchFamily="18" charset="0"/>
+                <a:cs typeface="Times New Roman" panose="02020603050405020304" pitchFamily="18" charset="0"/>
+              </a:endParaRPr>
             </a:p>
             <a:p>
               <a:pPr marL="571500" indent="-571500">
+                <a:lnSpc>
+                  <a:spcPts val="4020"/>
+                </a:lnSpc>
                 <a:buFont typeface="Arial" panose="020B0604020202020204" pitchFamily="34" charset="0"/>
                 <a:buChar char="•"/>
               </a:pPr>
@@ -4087,6 +4017,9 @@
             </a:p>
             <a:p>
               <a:pPr marL="571500" indent="-571500">
+                <a:lnSpc>
+                  <a:spcPts val="4020"/>
+                </a:lnSpc>
                 <a:buFont typeface="Arial" panose="020B0604020202020204" pitchFamily="34" charset="0"/>
                 <a:buChar char="•"/>
               </a:pPr>
@@ -4103,6 +4036,9 @@
             </a:p>
             <a:p>
               <a:pPr marL="571500" indent="-571500">
+                <a:lnSpc>
+                  <a:spcPts val="4020"/>
+                </a:lnSpc>
                 <a:buFont typeface="Arial" panose="020B0604020202020204" pitchFamily="34" charset="0"/>
                 <a:buChar char="•"/>
               </a:pPr>
@@ -4237,6 +4173,129 @@
                 <a:t> is the distance to the request</a:t>
               </a:r>
             </a:p>
+            <a:p>
+              <a:pPr marL="571500" indent="-571500">
+                <a:lnSpc>
+                  <a:spcPts val="4020"/>
+                </a:lnSpc>
+                <a:buFont typeface="Arial" panose="020B0604020202020204" pitchFamily="34" charset="0"/>
+                <a:buChar char="•"/>
+              </a:pPr>
+              <a:r>
+                <a:rPr lang="en-US" sz="3600" dirty="0">
+                  <a:solidFill>
+                    <a:schemeClr val="tx1"/>
+                  </a:solidFill>
+                  <a:latin typeface="Times New Roman" panose="02020603050405020304" pitchFamily="18" charset="0"/>
+                  <a:cs typeface="Times New Roman" panose="02020603050405020304" pitchFamily="18" charset="0"/>
+                </a:rPr>
+                <a:t>No-pickup Penalty is </a:t>
+              </a:r>
+              <a:r>
+                <a:rPr lang="en-US" sz="3600" i="1" dirty="0">
+                  <a:solidFill>
+                    <a:schemeClr val="tx1"/>
+                  </a:solidFill>
+                  <a:latin typeface="Times New Roman" panose="02020603050405020304" pitchFamily="18" charset="0"/>
+                  <a:cs typeface="Times New Roman" panose="02020603050405020304" pitchFamily="18" charset="0"/>
+                </a:rPr>
+                <a:t>not</a:t>
+              </a:r>
+              <a:r>
+                <a:rPr lang="en-US" sz="3600" dirty="0">
+                  <a:solidFill>
+                    <a:schemeClr val="tx1"/>
+                  </a:solidFill>
+                  <a:latin typeface="Times New Roman" panose="02020603050405020304" pitchFamily="18" charset="0"/>
+                  <a:cs typeface="Times New Roman" panose="02020603050405020304" pitchFamily="18" charset="0"/>
+                </a:rPr>
+                <a:t> used for DQN-rebalance</a:t>
+              </a:r>
+            </a:p>
+            <a:p>
+              <a:pPr marL="571500" indent="-571500">
+                <a:lnSpc>
+                  <a:spcPts val="4020"/>
+                </a:lnSpc>
+                <a:buFont typeface="Arial" panose="020B0604020202020204" pitchFamily="34" charset="0"/>
+                <a:buChar char="•"/>
+              </a:pPr>
+              <a:endParaRPr lang="en-US" sz="3600" dirty="0">
+                <a:solidFill>
+                  <a:schemeClr val="tx1"/>
+                </a:solidFill>
+                <a:latin typeface="Times New Roman" panose="02020603050405020304" pitchFamily="18" charset="0"/>
+                <a:cs typeface="Times New Roman" panose="02020603050405020304" pitchFamily="18" charset="0"/>
+              </a:endParaRPr>
+            </a:p>
+            <a:p>
+              <a:pPr>
+                <a:lnSpc>
+                  <a:spcPts val="4020"/>
+                </a:lnSpc>
+              </a:pPr>
+              <a:r>
+                <a:rPr lang="en-US" sz="3600" b="1" i="1" dirty="0">
+                  <a:solidFill>
+                    <a:schemeClr val="tx1"/>
+                  </a:solidFill>
+                  <a:latin typeface="Times New Roman" panose="02020603050405020304" pitchFamily="18" charset="0"/>
+                  <a:cs typeface="Times New Roman" panose="02020603050405020304" pitchFamily="18" charset="0"/>
+                </a:rPr>
+                <a:t>DQN &amp; DQN-rebalance</a:t>
+              </a:r>
+            </a:p>
+            <a:p>
+              <a:pPr marL="571500" indent="-571500">
+                <a:lnSpc>
+                  <a:spcPts val="4020"/>
+                </a:lnSpc>
+                <a:buFont typeface="Arial" panose="020B0604020202020204" pitchFamily="34" charset="0"/>
+                <a:buChar char="•"/>
+              </a:pPr>
+              <a:r>
+                <a:rPr lang="en-US" sz="3600" dirty="0">
+                  <a:solidFill>
+                    <a:schemeClr val="tx1"/>
+                  </a:solidFill>
+                  <a:latin typeface="Times New Roman" panose="02020603050405020304" pitchFamily="18" charset="0"/>
+                  <a:cs typeface="Times New Roman" panose="02020603050405020304" pitchFamily="18" charset="0"/>
+                </a:rPr>
+                <a:t>Pickup actions will be determined by the system in DQN-rebalance, in a greedy manner</a:t>
+              </a:r>
+            </a:p>
+            <a:p>
+              <a:pPr marL="571500" indent="-571500">
+                <a:lnSpc>
+                  <a:spcPts val="4020"/>
+                </a:lnSpc>
+                <a:buFont typeface="Arial" panose="020B0604020202020204" pitchFamily="34" charset="0"/>
+                <a:buChar char="•"/>
+              </a:pPr>
+              <a:r>
+                <a:rPr lang="en-US" sz="3600" dirty="0">
+                  <a:solidFill>
+                    <a:schemeClr val="tx1"/>
+                  </a:solidFill>
+                  <a:latin typeface="Times New Roman" panose="02020603050405020304" pitchFamily="18" charset="0"/>
+                  <a:cs typeface="Times New Roman" panose="02020603050405020304" pitchFamily="18" charset="0"/>
+                </a:rPr>
+                <a:t>Pickup actions are learnt in DQN (decentralized)</a:t>
+              </a:r>
+            </a:p>
+            <a:p>
+              <a:pPr marL="571500" indent="-571500">
+                <a:buFont typeface="Arial" panose="020B0604020202020204" pitchFamily="34" charset="0"/>
+                <a:buChar char="•"/>
+              </a:pPr>
+              <a:endParaRPr lang="en-US" sz="3600" dirty="0">
+                <a:solidFill>
+                  <a:schemeClr val="tx1"/>
+                </a:solidFill>
+                <a:latin typeface="Times New Roman" panose="02020603050405020304" pitchFamily="18" charset="0"/>
+                <a:cs typeface="Times New Roman" panose="02020603050405020304" pitchFamily="18" charset="0"/>
+              </a:endParaRPr>
+            </a:p>
           </p:txBody>
         </p:sp>
       </p:grpSp>
@@ -4254,10 +4313,10 @@
         </p:nvGrpSpPr>
         <p:grpSpPr>
           <a:xfrm>
-            <a:off x="12144136" y="4278650"/>
-            <a:ext cx="12293949" cy="14576910"/>
+            <a:off x="13914998" y="4278651"/>
+            <a:ext cx="10396963" cy="11164549"/>
             <a:chOff x="563232" y="4278651"/>
-            <a:chExt cx="10946274" cy="13005762"/>
+            <a:chExt cx="10946274" cy="9961194"/>
           </a:xfrm>
         </p:grpSpPr>
         <p:sp>
@@ -4312,7 +4371,7 @@
                   </a:solidFill>
                   <a:latin typeface="Libre Baskerville" panose="02000000000000000000" pitchFamily="2" charset="0"/>
                 </a:rPr>
-                <a:t>Network</a:t>
+                <a:t>Neural Network</a:t>
               </a:r>
             </a:p>
           </p:txBody>
@@ -4331,8 +4390,8 @@
           </p:nvSpPr>
           <p:spPr>
             <a:xfrm>
-              <a:off x="563232" y="5452533"/>
-              <a:ext cx="10946274" cy="11831880"/>
+              <a:off x="563232" y="5452534"/>
+              <a:ext cx="10946274" cy="8787314"/>
             </a:xfrm>
             <a:prstGeom prst="rect">
               <a:avLst/>
@@ -4358,6 +4417,33 @@
           <p:txBody>
             <a:bodyPr rtlCol="0" anchor="ctr" anchorCtr="0"/>
             <a:lstStyle/>
+            <a:p>
+              <a:endParaRPr lang="en-US" sz="3600" b="1" i="1" dirty="0">
+                <a:solidFill>
+                  <a:schemeClr val="tx1"/>
+                </a:solidFill>
+                <a:latin typeface="Times New Roman" panose="02020603050405020304" pitchFamily="18" charset="0"/>
+                <a:cs typeface="Times New Roman" panose="02020603050405020304" pitchFamily="18" charset="0"/>
+              </a:endParaRPr>
+            </a:p>
+            <a:p>
+              <a:endParaRPr lang="en-US" sz="3600" b="1" i="1" dirty="0">
+                <a:solidFill>
+                  <a:schemeClr val="tx1"/>
+                </a:solidFill>
+                <a:latin typeface="Times New Roman" panose="02020603050405020304" pitchFamily="18" charset="0"/>
+                <a:cs typeface="Times New Roman" panose="02020603050405020304" pitchFamily="18" charset="0"/>
+              </a:endParaRPr>
+            </a:p>
+            <a:p>
+              <a:endParaRPr lang="en-US" sz="3600" b="1" i="1" dirty="0">
+                <a:solidFill>
+                  <a:schemeClr val="tx1"/>
+                </a:solidFill>
+                <a:latin typeface="Times New Roman" panose="02020603050405020304" pitchFamily="18" charset="0"/>
+                <a:cs typeface="Times New Roman" panose="02020603050405020304" pitchFamily="18" charset="0"/>
+              </a:endParaRPr>
+            </a:p>
             <a:p>
               <a:r>
                 <a:rPr lang="en-US" sz="3600" b="1" i="1" dirty="0">
@@ -4425,25 +4511,7 @@
               </a:endParaRPr>
             </a:p>
             <a:p>
-              <a:endParaRPr lang="en-US" sz="3600" dirty="0">
-                <a:solidFill>
-                  <a:schemeClr val="tx1"/>
-                </a:solidFill>
-                <a:latin typeface="Times New Roman" panose="02020603050405020304" pitchFamily="18" charset="0"/>
-                <a:cs typeface="Times New Roman" panose="02020603050405020304" pitchFamily="18" charset="0"/>
-              </a:endParaRPr>
-            </a:p>
-            <a:p>
-              <a:br>
-                <a:rPr lang="en-US" sz="3600" dirty="0">
-                  <a:solidFill>
-                    <a:schemeClr val="tx1"/>
-                  </a:solidFill>
-                  <a:latin typeface="Times New Roman" panose="02020603050405020304" pitchFamily="18" charset="0"/>
-                  <a:cs typeface="Times New Roman" panose="02020603050405020304" pitchFamily="18" charset="0"/>
-                </a:rPr>
-              </a:br>
-              <a:endParaRPr lang="en-US" sz="3600" dirty="0">
+              <a:endParaRPr lang="en-US" sz="3600" b="1" i="1" dirty="0">
                 <a:solidFill>
                   <a:schemeClr val="tx1"/>
                 </a:solidFill>
@@ -4462,24 +4530,6 @@
                 </a:rPr>
                 <a:t>Actor-Critic</a:t>
               </a:r>
-            </a:p>
-            <a:p>
-              <a:endParaRPr lang="en-US" sz="3600" dirty="0">
-                <a:solidFill>
-                  <a:schemeClr val="tx1"/>
-                </a:solidFill>
-                <a:latin typeface="Times New Roman" panose="02020603050405020304" pitchFamily="18" charset="0"/>
-                <a:cs typeface="Times New Roman" panose="02020603050405020304" pitchFamily="18" charset="0"/>
-              </a:endParaRPr>
-            </a:p>
-            <a:p>
-              <a:endParaRPr lang="en-US" sz="3600" dirty="0">
-                <a:solidFill>
-                  <a:schemeClr val="tx1"/>
-                </a:solidFill>
-                <a:latin typeface="Times New Roman" panose="02020603050405020304" pitchFamily="18" charset="0"/>
-                <a:cs typeface="Times New Roman" panose="02020603050405020304" pitchFamily="18" charset="0"/>
-              </a:endParaRPr>
             </a:p>
             <a:p>
               <a:endParaRPr lang="en-US" sz="3600" dirty="0">
@@ -4596,8 +4646,8 @@
         </p:blipFill>
         <p:spPr>
           <a:xfrm>
-            <a:off x="12330910" y="6570115"/>
-            <a:ext cx="11914180" cy="3867430"/>
+            <a:off x="14985353" y="7212954"/>
+            <a:ext cx="9086370" cy="2853080"/>
           </a:xfrm>
           <a:prstGeom prst="rect">
             <a:avLst/>
@@ -4626,8 +4676,8 @@
         </p:blipFill>
         <p:spPr>
           <a:xfrm>
-            <a:off x="12330910" y="12224951"/>
-            <a:ext cx="12101446" cy="5598234"/>
+            <a:off x="15163433" y="11381725"/>
+            <a:ext cx="8730210" cy="3326968"/>
           </a:xfrm>
           <a:prstGeom prst="rect">
             <a:avLst/>
@@ -4648,10 +4698,10 @@
         </p:nvGrpSpPr>
         <p:grpSpPr>
           <a:xfrm>
-            <a:off x="12144135" y="19329749"/>
-            <a:ext cx="12288217" cy="7407042"/>
+            <a:off x="13894864" y="15827314"/>
+            <a:ext cx="10476532" cy="7407041"/>
             <a:chOff x="563232" y="4278651"/>
-            <a:chExt cx="10946274" cy="6608686"/>
+            <a:chExt cx="10946274" cy="6608685"/>
           </a:xfrm>
         </p:grpSpPr>
         <p:sp>
@@ -4669,7 +4719,7 @@
           <p:spPr>
             <a:xfrm>
               <a:off x="563232" y="4278651"/>
-              <a:ext cx="10946274" cy="1173882"/>
+              <a:ext cx="10946274" cy="1174814"/>
             </a:xfrm>
             <a:prstGeom prst="rect">
               <a:avLst/>
@@ -4726,7 +4776,7 @@
           <p:spPr>
             <a:xfrm>
               <a:off x="563232" y="5452532"/>
-              <a:ext cx="10946274" cy="5434805"/>
+              <a:ext cx="10946274" cy="5434804"/>
             </a:xfrm>
             <a:prstGeom prst="rect">
               <a:avLst/>
@@ -4753,56 +4803,13 @@
             <a:bodyPr rtlCol="0" anchor="ctr" anchorCtr="0"/>
             <a:lstStyle/>
             <a:p>
-              <a:r>
-                <a:rPr lang="en-US" sz="3600" dirty="0">
-                  <a:solidFill>
-                    <a:schemeClr val="tx1"/>
-                  </a:solidFill>
-                  <a:latin typeface="Times New Roman" panose="02020603050405020304" pitchFamily="18" charset="0"/>
-                  <a:cs typeface="Times New Roman" panose="02020603050405020304" pitchFamily="18" charset="0"/>
-                </a:rPr>
-                <a:t>With higher speed and less time spent in parking, autonomous mobility-on-demand (</a:t>
-              </a:r>
-              <a:r>
-                <a:rPr lang="en-US" sz="3600" dirty="0" err="1">
-                  <a:solidFill>
-                    <a:schemeClr val="tx1"/>
-                  </a:solidFill>
-                  <a:latin typeface="Times New Roman" panose="02020603050405020304" pitchFamily="18" charset="0"/>
-                  <a:cs typeface="Times New Roman" panose="02020603050405020304" pitchFamily="18" charset="0"/>
-                </a:rPr>
-                <a:t>AMoD</a:t>
-              </a:r>
-              <a:r>
-                <a:rPr lang="en-US" sz="3600" dirty="0">
-                  <a:solidFill>
-                    <a:schemeClr val="tx1"/>
-                  </a:solidFill>
-                  <a:latin typeface="Times New Roman" panose="02020603050405020304" pitchFamily="18" charset="0"/>
-                  <a:cs typeface="Times New Roman" panose="02020603050405020304" pitchFamily="18" charset="0"/>
-                </a:rPr>
-                <a:t>) system is predicted to be the solution for the future to reduce the pressure from urban mobility. In this project, we adopts Deep Q-Learning network (DQN) of the previous work and Actor-Critic Network (A2C), and creates new new states and actions, which are more close to the actual situation. The combination of the modified networks and the novel variables make the </a:t>
-              </a:r>
-              <a:r>
-                <a:rPr lang="en-US" sz="3600" dirty="0" err="1">
-                  <a:solidFill>
-                    <a:schemeClr val="tx1"/>
-                  </a:solidFill>
-                  <a:latin typeface="Times New Roman" panose="02020603050405020304" pitchFamily="18" charset="0"/>
-                  <a:cs typeface="Times New Roman" panose="02020603050405020304" pitchFamily="18" charset="0"/>
-                </a:rPr>
-                <a:t>AMoD</a:t>
-              </a:r>
-              <a:r>
-                <a:rPr lang="en-US" sz="3600" dirty="0">
-                  <a:solidFill>
-                    <a:schemeClr val="tx1"/>
-                  </a:solidFill>
-                  <a:latin typeface="Times New Roman" panose="02020603050405020304" pitchFamily="18" charset="0"/>
-                  <a:cs typeface="Times New Roman" panose="02020603050405020304" pitchFamily="18" charset="0"/>
-                </a:rPr>
-                <a:t> system more reliable.</a:t>
-              </a:r>
+              <a:endParaRPr lang="en-US" sz="3600" dirty="0">
+                <a:solidFill>
+                  <a:schemeClr val="tx1"/>
+                </a:solidFill>
+                <a:latin typeface="Times New Roman" panose="02020603050405020304" pitchFamily="18" charset="0"/>
+                <a:cs typeface="Times New Roman" panose="02020603050405020304" pitchFamily="18" charset="0"/>
+              </a:endParaRPr>
             </a:p>
           </p:txBody>
         </p:sp>
@@ -4821,10 +4828,10 @@
         </p:nvGrpSpPr>
         <p:grpSpPr>
           <a:xfrm>
-            <a:off x="25072742" y="4330635"/>
-            <a:ext cx="11201764" cy="10247960"/>
+            <a:off x="24946618" y="4282290"/>
+            <a:ext cx="11201764" cy="11160913"/>
             <a:chOff x="563232" y="4278651"/>
-            <a:chExt cx="10946274" cy="9143400"/>
+            <a:chExt cx="10946274" cy="9957952"/>
           </a:xfrm>
         </p:grpSpPr>
         <p:sp>
@@ -4899,7 +4906,7 @@
           <p:spPr>
             <a:xfrm>
               <a:off x="563232" y="5452532"/>
-              <a:ext cx="10946274" cy="7969519"/>
+              <a:ext cx="10946274" cy="8784071"/>
             </a:xfrm>
             <a:prstGeom prst="rect">
               <a:avLst/>
@@ -4926,56 +4933,13 @@
             <a:bodyPr rtlCol="0" anchor="ctr" anchorCtr="0"/>
             <a:lstStyle/>
             <a:p>
-              <a:r>
-                <a:rPr lang="en-US" sz="3600" dirty="0">
-                  <a:solidFill>
-                    <a:schemeClr val="tx1"/>
-                  </a:solidFill>
-                  <a:latin typeface="Times New Roman" panose="02020603050405020304" pitchFamily="18" charset="0"/>
-                  <a:cs typeface="Times New Roman" panose="02020603050405020304" pitchFamily="18" charset="0"/>
-                </a:rPr>
-                <a:t>With higher speed and less time spent in parking, autonomous mobility-on-demand (</a:t>
-              </a:r>
-              <a:r>
-                <a:rPr lang="en-US" sz="3600" dirty="0" err="1">
-                  <a:solidFill>
-                    <a:schemeClr val="tx1"/>
-                  </a:solidFill>
-                  <a:latin typeface="Times New Roman" panose="02020603050405020304" pitchFamily="18" charset="0"/>
-                  <a:cs typeface="Times New Roman" panose="02020603050405020304" pitchFamily="18" charset="0"/>
-                </a:rPr>
-                <a:t>AMoD</a:t>
-              </a:r>
-              <a:r>
-                <a:rPr lang="en-US" sz="3600" dirty="0">
-                  <a:solidFill>
-                    <a:schemeClr val="tx1"/>
-                  </a:solidFill>
-                  <a:latin typeface="Times New Roman" panose="02020603050405020304" pitchFamily="18" charset="0"/>
-                  <a:cs typeface="Times New Roman" panose="02020603050405020304" pitchFamily="18" charset="0"/>
-                </a:rPr>
-                <a:t>) system is predicted to be the solution for the future to reduce the pressure from urban mobility. In this project, we adopts Deep Q-Learning network (DQN) of the previous work and Actor-Critic Network (A2C), and creates new new states and actions, which are more close to the actual situation. The combination of the modified networks and the novel variables make the </a:t>
-              </a:r>
-              <a:r>
-                <a:rPr lang="en-US" sz="3600" dirty="0" err="1">
-                  <a:solidFill>
-                    <a:schemeClr val="tx1"/>
-                  </a:solidFill>
-                  <a:latin typeface="Times New Roman" panose="02020603050405020304" pitchFamily="18" charset="0"/>
-                  <a:cs typeface="Times New Roman" panose="02020603050405020304" pitchFamily="18" charset="0"/>
-                </a:rPr>
-                <a:t>AMoD</a:t>
-              </a:r>
-              <a:r>
-                <a:rPr lang="en-US" sz="3600" dirty="0">
-                  <a:solidFill>
-                    <a:schemeClr val="tx1"/>
-                  </a:solidFill>
-                  <a:latin typeface="Times New Roman" panose="02020603050405020304" pitchFamily="18" charset="0"/>
-                  <a:cs typeface="Times New Roman" panose="02020603050405020304" pitchFamily="18" charset="0"/>
-                </a:rPr>
-                <a:t> system more reliable.</a:t>
-              </a:r>
+              <a:endParaRPr lang="en-US" sz="3600" dirty="0">
+                <a:solidFill>
+                  <a:schemeClr val="tx1"/>
+                </a:solidFill>
+                <a:latin typeface="Times New Roman" panose="02020603050405020304" pitchFamily="18" charset="0"/>
+                <a:cs typeface="Times New Roman" panose="02020603050405020304" pitchFamily="18" charset="0"/>
+              </a:endParaRPr>
             </a:p>
           </p:txBody>
         </p:sp>
@@ -4994,10 +4958,10 @@
         </p:nvGrpSpPr>
         <p:grpSpPr>
           <a:xfrm>
-            <a:off x="25072741" y="14863614"/>
-            <a:ext cx="11201764" cy="3995928"/>
-            <a:chOff x="563232" y="4278651"/>
-            <a:chExt cx="10946274" cy="4791269"/>
+            <a:off x="24934277" y="15827315"/>
+            <a:ext cx="11214103" cy="7407041"/>
+            <a:chOff x="563232" y="4185904"/>
+            <a:chExt cx="10946274" cy="4122968"/>
           </a:xfrm>
         </p:grpSpPr>
         <p:sp>
@@ -5014,8 +4978,8 @@
           </p:nvSpPr>
           <p:spPr>
             <a:xfrm>
-              <a:off x="563232" y="4278651"/>
-              <a:ext cx="10946274" cy="1578816"/>
+              <a:off x="563232" y="4185904"/>
+              <a:ext cx="10946274" cy="732352"/>
             </a:xfrm>
             <a:prstGeom prst="rect">
               <a:avLst/>
@@ -5071,8 +5035,8 @@
           </p:nvSpPr>
           <p:spPr>
             <a:xfrm>
-              <a:off x="563232" y="5857467"/>
-              <a:ext cx="10946274" cy="3212453"/>
+              <a:off x="563232" y="4918255"/>
+              <a:ext cx="10946274" cy="3390617"/>
             </a:xfrm>
             <a:prstGeom prst="rect">
               <a:avLst/>
@@ -5099,6 +5063,36 @@
             <a:bodyPr rtlCol="0" anchor="ctr" anchorCtr="0"/>
             <a:lstStyle/>
             <a:p>
+              <a:pPr marL="571500" indent="-571500">
+                <a:buFont typeface="Arial" panose="020B0604020202020204" pitchFamily="34" charset="0"/>
+                <a:buChar char="•"/>
+              </a:pPr>
+              <a:endParaRPr lang="en-US" sz="3600" dirty="0">
+                <a:solidFill>
+                  <a:schemeClr val="tx1"/>
+                </a:solidFill>
+                <a:latin typeface="Times New Roman" panose="02020603050405020304" pitchFamily="18" charset="0"/>
+                <a:cs typeface="Times New Roman" panose="02020603050405020304" pitchFamily="18" charset="0"/>
+              </a:endParaRPr>
+            </a:p>
+            <a:p>
+              <a:pPr marL="571500" indent="-571500">
+                <a:buFont typeface="Arial" panose="020B0604020202020204" pitchFamily="34" charset="0"/>
+                <a:buChar char="•"/>
+              </a:pPr>
+              <a:endParaRPr lang="en-US" sz="3600" dirty="0">
+                <a:solidFill>
+                  <a:schemeClr val="tx1"/>
+                </a:solidFill>
+                <a:latin typeface="Times New Roman" panose="02020603050405020304" pitchFamily="18" charset="0"/>
+                <a:cs typeface="Times New Roman" panose="02020603050405020304" pitchFamily="18" charset="0"/>
+              </a:endParaRPr>
+            </a:p>
+            <a:p>
+              <a:pPr marL="571500" indent="-571500">
+                <a:buFont typeface="Arial" panose="020B0604020202020204" pitchFamily="34" charset="0"/>
+                <a:buChar char="•"/>
+              </a:pPr>
               <a:r>
                 <a:rPr lang="en-US" sz="3600" dirty="0">
                   <a:solidFill>
@@ -5107,17 +5101,71 @@
                   <a:latin typeface="Times New Roman" panose="02020603050405020304" pitchFamily="18" charset="0"/>
                   <a:cs typeface="Times New Roman" panose="02020603050405020304" pitchFamily="18" charset="0"/>
                 </a:rPr>
-                <a:t>Our work has demonstrated that given a well-rounded policy, the Reinforcement Learning method is an efficient tool in solving </a:t>
+                <a:t>Deep learning method is a successful way to reduce the average waiting time of AMoD system relatively</a:t>
               </a:r>
+            </a:p>
+            <a:p>
+              <a:pPr marL="571500" indent="-571500">
+                <a:buFont typeface="Arial" panose="020B0604020202020204" pitchFamily="34" charset="0"/>
+                <a:buChar char="•"/>
+              </a:pPr>
               <a:r>
-                <a:rPr lang="en-US" sz="3600" dirty="0" err="1">
+                <a:rPr lang="en-US" sz="3600" dirty="0">
                   <a:solidFill>
                     <a:schemeClr val="tx1"/>
                   </a:solidFill>
                   <a:latin typeface="Times New Roman" panose="02020603050405020304" pitchFamily="18" charset="0"/>
                   <a:cs typeface="Times New Roman" panose="02020603050405020304" pitchFamily="18" charset="0"/>
                 </a:rPr>
-                <a:t>AMoD</a:t>
+                <a:t>The performance of global strategies is better than that of decentralized strategies</a:t>
+              </a:r>
+            </a:p>
+            <a:p>
+              <a:pPr marL="571500" indent="-571500">
+                <a:buFont typeface="Arial" panose="020B0604020202020204" pitchFamily="34" charset="0"/>
+                <a:buChar char="•"/>
+              </a:pPr>
+              <a:r>
+                <a:rPr lang="en-US" sz="3600" dirty="0">
+                  <a:solidFill>
+                    <a:schemeClr val="tx1"/>
+                  </a:solidFill>
+                  <a:latin typeface="Times New Roman" panose="02020603050405020304" pitchFamily="18" charset="0"/>
+                  <a:cs typeface="Times New Roman" panose="02020603050405020304" pitchFamily="18" charset="0"/>
+                </a:rPr>
+                <a:t>The DQN-rebalance model outperforms all other models </a:t>
+              </a:r>
+            </a:p>
+            <a:p>
+              <a:pPr marL="571500" indent="-571500">
+                <a:buFont typeface="Arial" panose="020B0604020202020204" pitchFamily="34" charset="0"/>
+                <a:buChar char="•"/>
+              </a:pPr>
+              <a:r>
+                <a:rPr lang="en-US" sz="3600" dirty="0">
+                  <a:solidFill>
+                    <a:schemeClr val="tx1"/>
+                  </a:solidFill>
+                  <a:latin typeface="Times New Roman" panose="02020603050405020304" pitchFamily="18" charset="0"/>
+                  <a:cs typeface="Times New Roman" panose="02020603050405020304" pitchFamily="18" charset="0"/>
+                </a:rPr>
+                <a:t>The action space including pickups and rebalance is hard to be learnt in the network, while the action space with only rebalance is relatively easier.</a:t>
+              </a:r>
+            </a:p>
+            <a:p>
+              <a:pPr marL="571500" indent="-571500">
+                <a:buFont typeface="Arial" panose="020B0604020202020204" pitchFamily="34" charset="0"/>
+                <a:buChar char="•"/>
+              </a:pPr>
+              <a:r>
+                <a:rPr lang="en-US" sz="3600">
+                  <a:solidFill>
+                    <a:schemeClr val="tx1"/>
+                  </a:solidFill>
+                  <a:latin typeface="Times New Roman" panose="02020603050405020304" pitchFamily="18" charset="0"/>
+                  <a:cs typeface="Times New Roman" panose="02020603050405020304" pitchFamily="18" charset="0"/>
+                </a:rPr>
+                <a:t>Future work</a:t>
               </a:r>
               <a:r>
                 <a:rPr lang="en-US" sz="3600" dirty="0">
@@ -5127,8 +5175,34 @@
                   <a:latin typeface="Times New Roman" panose="02020603050405020304" pitchFamily="18" charset="0"/>
                   <a:cs typeface="Times New Roman" panose="02020603050405020304" pitchFamily="18" charset="0"/>
                 </a:rPr>
-                <a:t>-related problems. </a:t>
+                <a:t>: Global Rebalance vs. Local Rebalance</a:t>
               </a:r>
+            </a:p>
+            <a:p>
+              <a:pPr marL="571500" indent="-571500">
+                <a:buFont typeface="Arial" panose="020B0604020202020204" pitchFamily="34" charset="0"/>
+                <a:buChar char="•"/>
+              </a:pPr>
+              <a:endParaRPr lang="en-US" sz="3600" dirty="0">
+                <a:solidFill>
+                  <a:schemeClr val="tx1"/>
+                </a:solidFill>
+                <a:latin typeface="Times New Roman" panose="02020603050405020304" pitchFamily="18" charset="0"/>
+                <a:cs typeface="Times New Roman" panose="02020603050405020304" pitchFamily="18" charset="0"/>
+              </a:endParaRPr>
+            </a:p>
+            <a:p>
+              <a:pPr marL="571500" indent="-571500">
+                <a:buFont typeface="Arial" panose="020B0604020202020204" pitchFamily="34" charset="0"/>
+                <a:buChar char="•"/>
+              </a:pPr>
+              <a:endParaRPr lang="en-US" sz="3600" dirty="0">
+                <a:solidFill>
+                  <a:schemeClr val="tx1"/>
+                </a:solidFill>
+                <a:latin typeface="Times New Roman" panose="02020603050405020304" pitchFamily="18" charset="0"/>
+                <a:cs typeface="Times New Roman" panose="02020603050405020304" pitchFamily="18" charset="0"/>
+              </a:endParaRPr>
             </a:p>
           </p:txBody>
         </p:sp>
@@ -5147,10 +5221,10 @@
         </p:nvGrpSpPr>
         <p:grpSpPr>
           <a:xfrm>
-            <a:off x="25072741" y="19329749"/>
-            <a:ext cx="11201764" cy="7407042"/>
-            <a:chOff x="563232" y="4278651"/>
-            <a:chExt cx="10946274" cy="4791269"/>
+            <a:off x="13894865" y="23672484"/>
+            <a:ext cx="22241178" cy="3064306"/>
+            <a:chOff x="563232" y="3710317"/>
+            <a:chExt cx="10946274" cy="5359603"/>
           </a:xfrm>
         </p:grpSpPr>
         <p:sp>
@@ -5167,8 +5241,8 @@
           </p:nvSpPr>
           <p:spPr>
             <a:xfrm>
-              <a:off x="563232" y="4278651"/>
-              <a:ext cx="10946274" cy="851059"/>
+              <a:off x="563232" y="3710317"/>
+              <a:ext cx="10946274" cy="1419394"/>
             </a:xfrm>
             <a:prstGeom prst="rect">
               <a:avLst/>
@@ -5199,7 +5273,7 @@
             <a:p>
               <a:pPr algn="ctr"/>
               <a:r>
-                <a:rPr lang="en-US" sz="5600" dirty="0">
+                <a:rPr lang="en-US" sz="4400" dirty="0">
                   <a:solidFill>
                     <a:schemeClr val="bg1"/>
                   </a:solidFill>
@@ -5253,183 +5327,223 @@
             <a:lstStyle/>
             <a:p>
               <a:r>
-                <a:rPr lang="en-US" sz="3600" dirty="0">
+                <a:rPr lang="en-US" sz="2800" dirty="0">
                   <a:solidFill>
                     <a:schemeClr val="tx1"/>
                   </a:solidFill>
                   <a:latin typeface="Times New Roman" panose="02020603050405020304" pitchFamily="18" charset="0"/>
                   <a:cs typeface="Times New Roman" panose="02020603050405020304" pitchFamily="18" charset="0"/>
                 </a:rPr>
-                <a:t>[1] </a:t>
+                <a:t>[1] Mnih, V., Kavukcuoglu, K., Silver, D., Rusu, A. A., Veness, J., Bellemare, M. G., ... &amp; Petersen, S. (2015). Human-level control through deep reinforcement learning. Nature, 518(7540), 529.</a:t>
               </a:r>
+            </a:p>
+            <a:p>
               <a:r>
-                <a:rPr lang="en-US" sz="3600" dirty="0" err="1">
+                <a:rPr lang="en-US" sz="2800" dirty="0">
                   <a:solidFill>
                     <a:schemeClr val="tx1"/>
                   </a:solidFill>
                   <a:latin typeface="Times New Roman" panose="02020603050405020304" pitchFamily="18" charset="0"/>
                   <a:cs typeface="Times New Roman" panose="02020603050405020304" pitchFamily="18" charset="0"/>
                 </a:rPr>
-                <a:t>Mnih</a:t>
+                <a:t>[2] Konda, V. R., &amp; Tsitsiklis, J. N. (2000). Actor-critic algorithms. In Advances in neural information processing systems (pp. 1008-1014.</a:t>
               </a:r>
+            </a:p>
+            <a:p>
               <a:r>
-                <a:rPr lang="en-US" sz="3600" dirty="0">
+                <a:rPr lang="en-US" sz="2800" dirty="0">
                   <a:solidFill>
                     <a:schemeClr val="tx1"/>
                   </a:solidFill>
                   <a:latin typeface="Times New Roman" panose="02020603050405020304" pitchFamily="18" charset="0"/>
                   <a:cs typeface="Times New Roman" panose="02020603050405020304" pitchFamily="18" charset="0"/>
                 </a:rPr>
-                <a:t>, V., </a:t>
-              </a:r>
-              <a:r>
-                <a:rPr lang="en-US" sz="3600" dirty="0" err="1">
-                  <a:solidFill>
-                    <a:schemeClr val="tx1"/>
-                  </a:solidFill>
-                  <a:latin typeface="Times New Roman" panose="02020603050405020304" pitchFamily="18" charset="0"/>
-                  <a:cs typeface="Times New Roman" panose="02020603050405020304" pitchFamily="18" charset="0"/>
-                </a:rPr>
-                <a:t>Kavukcuoglu</a:t>
-              </a:r>
-              <a:r>
-                <a:rPr lang="en-US" sz="3600" dirty="0">
-                  <a:solidFill>
-                    <a:schemeClr val="tx1"/>
-                  </a:solidFill>
-                  <a:latin typeface="Times New Roman" panose="02020603050405020304" pitchFamily="18" charset="0"/>
-                  <a:cs typeface="Times New Roman" panose="02020603050405020304" pitchFamily="18" charset="0"/>
-                </a:rPr>
-                <a:t>, K., Silver, D., </a:t>
-              </a:r>
-              <a:r>
-                <a:rPr lang="en-US" sz="3600" dirty="0" err="1">
-                  <a:solidFill>
-                    <a:schemeClr val="tx1"/>
-                  </a:solidFill>
-                  <a:latin typeface="Times New Roman" panose="02020603050405020304" pitchFamily="18" charset="0"/>
-                  <a:cs typeface="Times New Roman" panose="02020603050405020304" pitchFamily="18" charset="0"/>
-                </a:rPr>
-                <a:t>Rusu</a:t>
-              </a:r>
-              <a:r>
-                <a:rPr lang="en-US" sz="3600" dirty="0">
-                  <a:solidFill>
-                    <a:schemeClr val="tx1"/>
-                  </a:solidFill>
-                  <a:latin typeface="Times New Roman" panose="02020603050405020304" pitchFamily="18" charset="0"/>
-                  <a:cs typeface="Times New Roman" panose="02020603050405020304" pitchFamily="18" charset="0"/>
-                </a:rPr>
-                <a:t>, A. A., </a:t>
-              </a:r>
-              <a:r>
-                <a:rPr lang="en-US" sz="3600" dirty="0" err="1">
-                  <a:solidFill>
-                    <a:schemeClr val="tx1"/>
-                  </a:solidFill>
-                  <a:latin typeface="Times New Roman" panose="02020603050405020304" pitchFamily="18" charset="0"/>
-                  <a:cs typeface="Times New Roman" panose="02020603050405020304" pitchFamily="18" charset="0"/>
-                </a:rPr>
-                <a:t>Veness</a:t>
-              </a:r>
-              <a:r>
-                <a:rPr lang="en-US" sz="3600" dirty="0">
-                  <a:solidFill>
-                    <a:schemeClr val="tx1"/>
-                  </a:solidFill>
-                  <a:latin typeface="Times New Roman" panose="02020603050405020304" pitchFamily="18" charset="0"/>
-                  <a:cs typeface="Times New Roman" panose="02020603050405020304" pitchFamily="18" charset="0"/>
-                </a:rPr>
-                <a:t>, J., </a:t>
-              </a:r>
-              <a:r>
-                <a:rPr lang="en-US" sz="3600" dirty="0" err="1">
-                  <a:solidFill>
-                    <a:schemeClr val="tx1"/>
-                  </a:solidFill>
-                  <a:latin typeface="Times New Roman" panose="02020603050405020304" pitchFamily="18" charset="0"/>
-                  <a:cs typeface="Times New Roman" panose="02020603050405020304" pitchFamily="18" charset="0"/>
-                </a:rPr>
-                <a:t>Bellemare</a:t>
-              </a:r>
-              <a:r>
-                <a:rPr lang="en-US" sz="3600" dirty="0">
-                  <a:solidFill>
-                    <a:schemeClr val="tx1"/>
-                  </a:solidFill>
-                  <a:latin typeface="Times New Roman" panose="02020603050405020304" pitchFamily="18" charset="0"/>
-                  <a:cs typeface="Times New Roman" panose="02020603050405020304" pitchFamily="18" charset="0"/>
-                </a:rPr>
-                <a:t>, M. G., ... &amp; Petersen, S. (2015). Human-level control through deep reinforcement learning. Nature, 518(7540), 529.</a:t>
-              </a:r>
-            </a:p>
-            <a:p>
-              <a:r>
-                <a:rPr lang="en-US" sz="3600" dirty="0">
-                  <a:solidFill>
-                    <a:schemeClr val="tx1"/>
-                  </a:solidFill>
-                  <a:latin typeface="Times New Roman" panose="02020603050405020304" pitchFamily="18" charset="0"/>
-                  <a:cs typeface="Times New Roman" panose="02020603050405020304" pitchFamily="18" charset="0"/>
-                </a:rPr>
-                <a:t>[2] Konda, V. R., &amp; </a:t>
-              </a:r>
-              <a:r>
-                <a:rPr lang="en-US" sz="3600" dirty="0" err="1">
-                  <a:solidFill>
-                    <a:schemeClr val="tx1"/>
-                  </a:solidFill>
-                  <a:latin typeface="Times New Roman" panose="02020603050405020304" pitchFamily="18" charset="0"/>
-                  <a:cs typeface="Times New Roman" panose="02020603050405020304" pitchFamily="18" charset="0"/>
-                </a:rPr>
-                <a:t>Tsitsiklis</a:t>
-              </a:r>
-              <a:r>
-                <a:rPr lang="en-US" sz="3600" dirty="0">
-                  <a:solidFill>
-                    <a:schemeClr val="tx1"/>
-                  </a:solidFill>
-                  <a:latin typeface="Times New Roman" panose="02020603050405020304" pitchFamily="18" charset="0"/>
-                  <a:cs typeface="Times New Roman" panose="02020603050405020304" pitchFamily="18" charset="0"/>
-                </a:rPr>
-                <a:t>, J. N. (2000). Actor-critic algorithms. In Advances in neural information processing systems (pp. 1008-1014.</a:t>
-              </a:r>
-            </a:p>
-            <a:p>
-              <a:r>
-                <a:rPr lang="en-US" sz="3600" dirty="0">
-                  <a:solidFill>
-                    <a:schemeClr val="tx1"/>
-                  </a:solidFill>
-                  <a:latin typeface="Times New Roman" panose="02020603050405020304" pitchFamily="18" charset="0"/>
-                  <a:cs typeface="Times New Roman" panose="02020603050405020304" pitchFamily="18" charset="0"/>
-                </a:rPr>
-                <a:t>[3] Jonker, R., &amp; </a:t>
-              </a:r>
-              <a:r>
-                <a:rPr lang="en-US" sz="3600" dirty="0" err="1">
-                  <a:solidFill>
-                    <a:schemeClr val="tx1"/>
-                  </a:solidFill>
-                  <a:latin typeface="Times New Roman" panose="02020603050405020304" pitchFamily="18" charset="0"/>
-                  <a:cs typeface="Times New Roman" panose="02020603050405020304" pitchFamily="18" charset="0"/>
-                </a:rPr>
-                <a:t>Volgenant</a:t>
-              </a:r>
-              <a:r>
-                <a:rPr lang="en-US" sz="3600" dirty="0">
-                  <a:solidFill>
-                    <a:schemeClr val="tx1"/>
-                  </a:solidFill>
-                  <a:latin typeface="Times New Roman" panose="02020603050405020304" pitchFamily="18" charset="0"/>
-                  <a:cs typeface="Times New Roman" panose="02020603050405020304" pitchFamily="18" charset="0"/>
-                </a:rPr>
-                <a:t>, T. (1986). Improving the Hungarian assignment algorithm. Operations Research Letters, 5(4), 171-175.</a:t>
+                <a:t>[3] Jonker, R., &amp; Volgenant, T. (1986). Improving the Hungarian assignment algorithm. Operations Research Letters, 5(4), 171-175.</a:t>
               </a:r>
             </a:p>
           </p:txBody>
         </p:sp>
       </p:grpSp>
+      <p:pic>
+        <p:nvPicPr>
+          <p:cNvPr id="3" name="Picture 2">
+            <a:extLst>
+              <a:ext uri="{FF2B5EF4-FFF2-40B4-BE49-F238E27FC236}">
+                <a16:creationId xmlns:a16="http://schemas.microsoft.com/office/drawing/2014/main" id="{6ACBBDF4-0521-4848-881A-5257C4BFFBD3}"/>
+              </a:ext>
+            </a:extLst>
+          </p:cNvPr>
+          <p:cNvPicPr>
+            <a:picLocks noChangeAspect="1"/>
+          </p:cNvPicPr>
+          <p:nvPr/>
+        </p:nvPicPr>
+        <p:blipFill>
+          <a:blip r:embed="rId6"/>
+          <a:stretch>
+            <a:fillRect/>
+          </a:stretch>
+        </p:blipFill>
+        <p:spPr>
+          <a:xfrm>
+            <a:off x="25195795" y="10757912"/>
+            <a:ext cx="5351705" cy="4005072"/>
+          </a:xfrm>
+          <a:prstGeom prst="rect">
+            <a:avLst/>
+          </a:prstGeom>
+        </p:spPr>
+      </p:pic>
+      <p:pic>
+        <p:nvPicPr>
+          <p:cNvPr id="12" name="Picture 11">
+            <a:extLst>
+              <a:ext uri="{FF2B5EF4-FFF2-40B4-BE49-F238E27FC236}">
+                <a16:creationId xmlns:a16="http://schemas.microsoft.com/office/drawing/2014/main" id="{7635D38C-E37F-DA45-A299-9B4BE4A37D17}"/>
+              </a:ext>
+            </a:extLst>
+          </p:cNvPr>
+          <p:cNvPicPr>
+            <a:picLocks noChangeAspect="1"/>
+          </p:cNvPicPr>
+          <p:nvPr/>
+        </p:nvPicPr>
+        <p:blipFill>
+          <a:blip r:embed="rId7"/>
+          <a:stretch>
+            <a:fillRect/>
+          </a:stretch>
+        </p:blipFill>
+        <p:spPr>
+          <a:xfrm>
+            <a:off x="30681978" y="10734655"/>
+            <a:ext cx="5351705" cy="4005072"/>
+          </a:xfrm>
+          <a:prstGeom prst="rect">
+            <a:avLst/>
+          </a:prstGeom>
+        </p:spPr>
+      </p:pic>
+      <p:pic>
+        <p:nvPicPr>
+          <p:cNvPr id="14" name="Picture 13">
+            <a:extLst>
+              <a:ext uri="{FF2B5EF4-FFF2-40B4-BE49-F238E27FC236}">
+                <a16:creationId xmlns:a16="http://schemas.microsoft.com/office/drawing/2014/main" id="{A45AD6A7-6573-A242-831B-71F39C5F4EB6}"/>
+              </a:ext>
+            </a:extLst>
+          </p:cNvPr>
+          <p:cNvPicPr>
+            <a:picLocks noChangeAspect="1"/>
+          </p:cNvPicPr>
+          <p:nvPr/>
+        </p:nvPicPr>
+        <p:blipFill>
+          <a:blip r:embed="rId8"/>
+          <a:stretch>
+            <a:fillRect/>
+          </a:stretch>
+        </p:blipFill>
+        <p:spPr>
+          <a:xfrm>
+            <a:off x="24977165" y="5894754"/>
+            <a:ext cx="5351705" cy="4005072"/>
+          </a:xfrm>
+          <a:prstGeom prst="rect">
+            <a:avLst/>
+          </a:prstGeom>
+        </p:spPr>
+      </p:pic>
+      <p:pic>
+        <p:nvPicPr>
+          <p:cNvPr id="44" name="Picture 43">
+            <a:extLst>
+              <a:ext uri="{FF2B5EF4-FFF2-40B4-BE49-F238E27FC236}">
+                <a16:creationId xmlns:a16="http://schemas.microsoft.com/office/drawing/2014/main" id="{DC7C2C05-3554-5F4C-A9AE-D1F358C5077B}"/>
+              </a:ext>
+            </a:extLst>
+          </p:cNvPr>
+          <p:cNvPicPr>
+            <a:picLocks noChangeAspect="1"/>
+          </p:cNvPicPr>
+          <p:nvPr/>
+        </p:nvPicPr>
+        <p:blipFill>
+          <a:blip r:embed="rId9"/>
+          <a:stretch>
+            <a:fillRect/>
+          </a:stretch>
+        </p:blipFill>
+        <p:spPr>
+          <a:xfrm>
+            <a:off x="30641549" y="5894755"/>
+            <a:ext cx="5494493" cy="4111931"/>
+          </a:xfrm>
+          <a:prstGeom prst="rect">
+            <a:avLst/>
+          </a:prstGeom>
+        </p:spPr>
+      </p:pic>
+      <p:pic>
+        <p:nvPicPr>
+          <p:cNvPr id="26" name="Picture 25" descr="A screenshot of a cell phone&#10;&#10;Description automatically generated">
+            <a:extLst>
+              <a:ext uri="{FF2B5EF4-FFF2-40B4-BE49-F238E27FC236}">
+                <a16:creationId xmlns:a16="http://schemas.microsoft.com/office/drawing/2014/main" id="{DAE39356-54E8-E94B-824A-DCC7517A823C}"/>
+              </a:ext>
+            </a:extLst>
+          </p:cNvPr>
+          <p:cNvPicPr>
+            <a:picLocks noChangeAspect="1"/>
+          </p:cNvPicPr>
+          <p:nvPr/>
+        </p:nvPicPr>
+        <p:blipFill>
+          <a:blip r:embed="rId10"/>
+          <a:stretch>
+            <a:fillRect/>
+          </a:stretch>
+        </p:blipFill>
+        <p:spPr>
+          <a:xfrm>
+            <a:off x="14208904" y="17281258"/>
+            <a:ext cx="9809150" cy="5814843"/>
+          </a:xfrm>
+          <a:prstGeom prst="rect">
+            <a:avLst/>
+          </a:prstGeom>
+        </p:spPr>
+      </p:pic>
+      <p:pic>
+        <p:nvPicPr>
+          <p:cNvPr id="4" name="Picture 3">
+            <a:extLst>
+              <a:ext uri="{FF2B5EF4-FFF2-40B4-BE49-F238E27FC236}">
+                <a16:creationId xmlns:a16="http://schemas.microsoft.com/office/drawing/2014/main" id="{DCBDB120-2422-284B-812C-83FA3DE3A891}"/>
+              </a:ext>
+            </a:extLst>
+          </p:cNvPr>
+          <p:cNvPicPr>
+            <a:picLocks noChangeAspect="1"/>
+          </p:cNvPicPr>
+          <p:nvPr/>
+        </p:nvPicPr>
+        <p:blipFill>
+          <a:blip r:embed="rId11"/>
+          <a:stretch>
+            <a:fillRect/>
+          </a:stretch>
+        </p:blipFill>
+        <p:spPr>
+          <a:xfrm>
+            <a:off x="700615" y="18608721"/>
+            <a:ext cx="12151474" cy="683071"/>
+          </a:xfrm>
+          <a:prstGeom prst="rect">
+            <a:avLst/>
+          </a:prstGeom>
+        </p:spPr>
+      </p:pic>
     </p:spTree>
     <p:extLst>
       <p:ext uri="{BB962C8B-B14F-4D97-AF65-F5344CB8AC3E}">

</xml_diff>